<commit_message>
Small changes before starting Allison's first round of edits.
</commit_message>
<xml_diff>
--- a/Images/Chapter2/ControlBlockDiagram/ControlBlockDiagram.pptx
+++ b/Images/Chapter2/ControlBlockDiagram/ControlBlockDiagram.pptx
@@ -104,6 +104,22 @@
       </a:defRPr>
     </a:lvl9pPr>
   </p:defaultTextStyle>
+  <p:extLst>
+    <p:ext uri="{EFAFB233-063F-42B5-8137-9DF3F51BA10A}">
+      <p15:sldGuideLst xmlns:p15="http://schemas.microsoft.com/office/powerpoint/2012/main">
+        <p15:guide id="1" orient="horz" pos="721">
+          <p15:clr>
+            <a:srgbClr val="A4A3A4"/>
+          </p15:clr>
+        </p15:guide>
+        <p15:guide id="2" pos="1872">
+          <p15:clr>
+            <a:srgbClr val="A4A3A4"/>
+          </p15:clr>
+        </p15:guide>
+      </p15:sldGuideLst>
+    </p:ext>
+  </p:extLst>
 </p:presentation>
 </file>
 
@@ -288,7 +304,7 @@
           <a:p>
             <a:fld id="{3C272F55-3C83-4506-9898-EE46A81079BC}" type="datetimeFigureOut">
               <a:rPr lang="en-US" smtClean="0"/>
-              <a:t>7/22/2014</a:t>
+              <a:t>10/25/2015</a:t>
             </a:fld>
             <a:endParaRPr lang="en-US"/>
           </a:p>
@@ -458,7 +474,7 @@
           <a:p>
             <a:fld id="{3C272F55-3C83-4506-9898-EE46A81079BC}" type="datetimeFigureOut">
               <a:rPr lang="en-US" smtClean="0"/>
-              <a:t>7/22/2014</a:t>
+              <a:t>10/25/2015</a:t>
             </a:fld>
             <a:endParaRPr lang="en-US"/>
           </a:p>
@@ -638,7 +654,7 @@
           <a:p>
             <a:fld id="{3C272F55-3C83-4506-9898-EE46A81079BC}" type="datetimeFigureOut">
               <a:rPr lang="en-US" smtClean="0"/>
-              <a:t>7/22/2014</a:t>
+              <a:t>10/25/2015</a:t>
             </a:fld>
             <a:endParaRPr lang="en-US"/>
           </a:p>
@@ -808,7 +824,7 @@
           <a:p>
             <a:fld id="{3C272F55-3C83-4506-9898-EE46A81079BC}" type="datetimeFigureOut">
               <a:rPr lang="en-US" smtClean="0"/>
-              <a:t>7/22/2014</a:t>
+              <a:t>10/25/2015</a:t>
             </a:fld>
             <a:endParaRPr lang="en-US"/>
           </a:p>
@@ -1054,7 +1070,7 @@
           <a:p>
             <a:fld id="{3C272F55-3C83-4506-9898-EE46A81079BC}" type="datetimeFigureOut">
               <a:rPr lang="en-US" smtClean="0"/>
-              <a:t>7/22/2014</a:t>
+              <a:t>10/25/2015</a:t>
             </a:fld>
             <a:endParaRPr lang="en-US"/>
           </a:p>
@@ -1342,7 +1358,7 @@
           <a:p>
             <a:fld id="{3C272F55-3C83-4506-9898-EE46A81079BC}" type="datetimeFigureOut">
               <a:rPr lang="en-US" smtClean="0"/>
-              <a:t>7/22/2014</a:t>
+              <a:t>10/25/2015</a:t>
             </a:fld>
             <a:endParaRPr lang="en-US"/>
           </a:p>
@@ -1764,7 +1780,7 @@
           <a:p>
             <a:fld id="{3C272F55-3C83-4506-9898-EE46A81079BC}" type="datetimeFigureOut">
               <a:rPr lang="en-US" smtClean="0"/>
-              <a:t>7/22/2014</a:t>
+              <a:t>10/25/2015</a:t>
             </a:fld>
             <a:endParaRPr lang="en-US"/>
           </a:p>
@@ -1882,7 +1898,7 @@
           <a:p>
             <a:fld id="{3C272F55-3C83-4506-9898-EE46A81079BC}" type="datetimeFigureOut">
               <a:rPr lang="en-US" smtClean="0"/>
-              <a:t>7/22/2014</a:t>
+              <a:t>10/25/2015</a:t>
             </a:fld>
             <a:endParaRPr lang="en-US"/>
           </a:p>
@@ -1977,7 +1993,7 @@
           <a:p>
             <a:fld id="{3C272F55-3C83-4506-9898-EE46A81079BC}" type="datetimeFigureOut">
               <a:rPr lang="en-US" smtClean="0"/>
-              <a:t>7/22/2014</a:t>
+              <a:t>10/25/2015</a:t>
             </a:fld>
             <a:endParaRPr lang="en-US"/>
           </a:p>
@@ -2254,7 +2270,7 @@
           <a:p>
             <a:fld id="{3C272F55-3C83-4506-9898-EE46A81079BC}" type="datetimeFigureOut">
               <a:rPr lang="en-US" smtClean="0"/>
-              <a:t>7/22/2014</a:t>
+              <a:t>10/25/2015</a:t>
             </a:fld>
             <a:endParaRPr lang="en-US"/>
           </a:p>
@@ -2507,7 +2523,7 @@
           <a:p>
             <a:fld id="{3C272F55-3C83-4506-9898-EE46A81079BC}" type="datetimeFigureOut">
               <a:rPr lang="en-US" smtClean="0"/>
-              <a:t>7/22/2014</a:t>
+              <a:t>10/25/2015</a:t>
             </a:fld>
             <a:endParaRPr lang="en-US"/>
           </a:p>
@@ -2720,7 +2736,7 @@
           <a:p>
             <a:fld id="{3C272F55-3C83-4506-9898-EE46A81079BC}" type="datetimeFigureOut">
               <a:rPr lang="en-US" smtClean="0"/>
-              <a:t>7/22/2014</a:t>
+              <a:t>10/25/2015</a:t>
             </a:fld>
             <a:endParaRPr lang="en-US"/>
           </a:p>
@@ -3313,17 +3329,7 @@
                 <a:latin typeface="NimbusRomNo9L" panose="01010103010101010101" pitchFamily="2" charset="0"/>
                 <a:cs typeface="Times New Roman" pitchFamily="18" charset="0"/>
               </a:rPr>
-              <a:t>2-D </a:t>
-            </a:r>
-            <a:r>
-              <a:rPr lang="en-US" sz="1100" b="1" dirty="0" smtClean="0">
-                <a:solidFill>
-                  <a:schemeClr val="tx1"/>
-                </a:solidFill>
-                <a:latin typeface="NimbusRomNo9L" panose="01010103010101010101" pitchFamily="2" charset="0"/>
-                <a:cs typeface="Times New Roman" pitchFamily="18" charset="0"/>
-              </a:rPr>
-              <a:t>Image </a:t>
+              <a:t>2-D Image </a:t>
             </a:r>
             <a:r>
               <a:rPr lang="en-US" sz="1100" b="1" dirty="0">
@@ -4198,7 +4204,7 @@
                             <a:solidFill>
                               <a:schemeClr val="tx1"/>
                             </a:solidFill>
-                            <a:latin typeface="Cambria Math"/>
+                            <a:latin typeface="Cambria Math" panose="02040503050406030204" pitchFamily="18" charset="0"/>
                             <a:ea typeface="Cambria Math"/>
                             <a:cs typeface="Times New Roman" pitchFamily="18" charset="0"/>
                           </a:rPr>
@@ -4286,7 +4292,7 @@
                             <a:solidFill>
                               <a:schemeClr val="tx1"/>
                             </a:solidFill>
-                            <a:latin typeface="Cambria Math"/>
+                            <a:latin typeface="Cambria Math" panose="02040503050406030204" pitchFamily="18" charset="0"/>
                             <a:ea typeface="Cambria Math"/>
                             <a:cs typeface="Times New Roman" pitchFamily="18" charset="0"/>
                           </a:rPr>
@@ -4459,17 +4465,7 @@
                 <a:latin typeface="NimbusRomNo9L" panose="01010103010101010101" pitchFamily="2" charset="0"/>
                 <a:cs typeface="Times New Roman" pitchFamily="18" charset="0"/>
               </a:rPr>
-              <a:t>3-D </a:t>
-            </a:r>
-            <a:r>
-              <a:rPr lang="en-US" sz="1100" b="1" dirty="0" smtClean="0">
-                <a:solidFill>
-                  <a:schemeClr val="tx1"/>
-                </a:solidFill>
-                <a:latin typeface="NimbusRomNo9L" panose="01010103010101010101" pitchFamily="2" charset="0"/>
-                <a:cs typeface="Times New Roman" pitchFamily="18" charset="0"/>
-              </a:rPr>
-              <a:t>Shape</a:t>
+              <a:t>3-D Shape</a:t>
             </a:r>
           </a:p>
           <a:p>
@@ -4795,7 +4791,20 @@
                   <a:latin typeface="NimbusRomNo9L" panose="01010103010101010101" pitchFamily="2" charset="0"/>
                   <a:cs typeface="Times New Roman" pitchFamily="18" charset="0"/>
                 </a:rPr>
-                <a:t>Control Hardware</a:t>
+                <a:t>Motor</a:t>
+              </a:r>
+            </a:p>
+            <a:p>
+              <a:pPr algn="ctr"/>
+              <a:r>
+                <a:rPr lang="en-US" sz="1100" b="1" dirty="0" smtClean="0">
+                  <a:solidFill>
+                    <a:schemeClr val="tx1"/>
+                  </a:solidFill>
+                  <a:latin typeface="NimbusRomNo9L" panose="01010103010101010101" pitchFamily="2" charset="0"/>
+                  <a:cs typeface="Times New Roman" pitchFamily="18" charset="0"/>
+                </a:rPr>
+                <a:t>Controllers</a:t>
               </a:r>
               <a:endParaRPr lang="en-US" sz="1100" b="1" dirty="0">
                 <a:solidFill>
@@ -4862,7 +4871,7 @@
                                 <a:solidFill>
                                   <a:schemeClr val="tx1"/>
                                 </a:solidFill>
-                                <a:latin typeface="Cambria Math"/>
+                                <a:latin typeface="Cambria Math" panose="02040503050406030204" pitchFamily="18" charset="0"/>
                                 <a:ea typeface="Cambria Math"/>
                                 <a:cs typeface="Times New Roman" pitchFamily="18" charset="0"/>
                               </a:rPr>
@@ -4877,7 +4886,7 @@
                                     <a:solidFill>
                                       <a:schemeClr val="tx1"/>
                                     </a:solidFill>
-                                    <a:latin typeface="Cambria Math"/>
+                                    <a:latin typeface="Cambria Math" panose="02040503050406030204" pitchFamily="18" charset="0"/>
                                     <a:ea typeface="Cambria Math"/>
                                     <a:cs typeface="Times New Roman" pitchFamily="18" charset="0"/>
                                   </a:rPr>
@@ -4933,7 +4942,7 @@
                                 <a:solidFill>
                                   <a:schemeClr val="tx1"/>
                                 </a:solidFill>
-                                <a:latin typeface="Cambria Math"/>
+                                <a:latin typeface="Cambria Math" panose="02040503050406030204" pitchFamily="18" charset="0"/>
                                 <a:ea typeface="Cambria Math"/>
                                 <a:cs typeface="Times New Roman" pitchFamily="18" charset="0"/>
                               </a:rPr>
@@ -4948,7 +4957,7 @@
                                     <a:solidFill>
                                       <a:schemeClr val="tx1"/>
                                     </a:solidFill>
-                                    <a:latin typeface="Cambria Math"/>
+                                    <a:latin typeface="Cambria Math" panose="02040503050406030204" pitchFamily="18" charset="0"/>
                                     <a:ea typeface="Cambria Math"/>
                                     <a:cs typeface="Times New Roman" pitchFamily="18" charset="0"/>
                                   </a:rPr>

</xml_diff>

<commit_message>
Mostly done Steve's changes. Added discussion of differences in control. Expanded explanation of sliding mode control. Added block diagrams.
</commit_message>
<xml_diff>
--- a/Images/Chapter2/ControlBlockDiagram/ControlBlockDiagram.pptx
+++ b/Images/Chapter2/ControlBlockDiagram/ControlBlockDiagram.pptx
@@ -7,7 +7,7 @@
   <p:sldIdLst>
     <p:sldId id="256" r:id="rId2"/>
   </p:sldIdLst>
-  <p:sldSz cx="5943600" cy="2286000"/>
+  <p:sldSz cx="6858000" cy="2286000"/>
   <p:notesSz cx="6858000" cy="9144000"/>
   <p:defaultTextStyle>
     <a:defPPr>
@@ -107,12 +107,12 @@
   <p:extLst>
     <p:ext uri="{EFAFB233-063F-42B5-8137-9DF3F51BA10A}">
       <p15:sldGuideLst xmlns:p15="http://schemas.microsoft.com/office/powerpoint/2012/main">
-        <p15:guide id="1" orient="horz" pos="721">
+        <p15:guide id="1" orient="horz" pos="721" userDrawn="1">
           <p15:clr>
             <a:srgbClr val="A4A3A4"/>
           </p15:clr>
         </p15:guide>
-        <p15:guide id="2" pos="1872">
+        <p15:guide id="2" pos="2160" userDrawn="1">
           <p15:clr>
             <a:srgbClr val="A4A3A4"/>
           </p15:clr>
@@ -152,8 +152,8 @@
         </p:nvSpPr>
         <p:spPr>
           <a:xfrm>
-            <a:off x="445770" y="710143"/>
-            <a:ext cx="5052060" cy="490008"/>
+            <a:off x="514350" y="710143"/>
+            <a:ext cx="5829300" cy="490008"/>
           </a:xfrm>
         </p:spPr>
         <p:txBody>
@@ -180,8 +180,8 @@
         </p:nvSpPr>
         <p:spPr>
           <a:xfrm>
-            <a:off x="891540" y="1295400"/>
-            <a:ext cx="4160520" cy="584200"/>
+            <a:off x="1028700" y="1295400"/>
+            <a:ext cx="4800600" cy="584200"/>
           </a:xfrm>
         </p:spPr>
         <p:txBody>
@@ -197,7 +197,7 @@
                 </a:solidFill>
               </a:defRPr>
             </a:lvl1pPr>
-            <a:lvl2pPr marL="261244" indent="0" algn="ctr">
+            <a:lvl2pPr marL="301423" indent="0" algn="ctr">
               <a:buNone/>
               <a:defRPr>
                 <a:solidFill>
@@ -207,7 +207,7 @@
                 </a:solidFill>
               </a:defRPr>
             </a:lvl2pPr>
-            <a:lvl3pPr marL="522488" indent="0" algn="ctr">
+            <a:lvl3pPr marL="602847" indent="0" algn="ctr">
               <a:buNone/>
               <a:defRPr>
                 <a:solidFill>
@@ -217,7 +217,7 @@
                 </a:solidFill>
               </a:defRPr>
             </a:lvl3pPr>
-            <a:lvl4pPr marL="783732" indent="0" algn="ctr">
+            <a:lvl4pPr marL="904270" indent="0" algn="ctr">
               <a:buNone/>
               <a:defRPr>
                 <a:solidFill>
@@ -227,7 +227,7 @@
                 </a:solidFill>
               </a:defRPr>
             </a:lvl4pPr>
-            <a:lvl5pPr marL="1044976" indent="0" algn="ctr">
+            <a:lvl5pPr marL="1205693" indent="0" algn="ctr">
               <a:buNone/>
               <a:defRPr>
                 <a:solidFill>
@@ -237,7 +237,7 @@
                 </a:solidFill>
               </a:defRPr>
             </a:lvl5pPr>
-            <a:lvl6pPr marL="1306220" indent="0" algn="ctr">
+            <a:lvl6pPr marL="1507117" indent="0" algn="ctr">
               <a:buNone/>
               <a:defRPr>
                 <a:solidFill>
@@ -247,7 +247,7 @@
                 </a:solidFill>
               </a:defRPr>
             </a:lvl6pPr>
-            <a:lvl7pPr marL="1567464" indent="0" algn="ctr">
+            <a:lvl7pPr marL="1808540" indent="0" algn="ctr">
               <a:buNone/>
               <a:defRPr>
                 <a:solidFill>
@@ -257,7 +257,7 @@
                 </a:solidFill>
               </a:defRPr>
             </a:lvl7pPr>
-            <a:lvl8pPr marL="1828709" indent="0" algn="ctr">
+            <a:lvl8pPr marL="2109964" indent="0" algn="ctr">
               <a:buNone/>
               <a:defRPr>
                 <a:solidFill>
@@ -267,7 +267,7 @@
                 </a:solidFill>
               </a:defRPr>
             </a:lvl8pPr>
-            <a:lvl9pPr marL="2089953" indent="0" algn="ctr">
+            <a:lvl9pPr marL="2411388" indent="0" algn="ctr">
               <a:buNone/>
               <a:defRPr>
                 <a:solidFill>
@@ -304,7 +304,7 @@
           <a:p>
             <a:fld id="{3C272F55-3C83-4506-9898-EE46A81079BC}" type="datetimeFigureOut">
               <a:rPr lang="en-US" smtClean="0"/>
-              <a:t>10/25/2015</a:t>
+              <a:t>12/1/2015</a:t>
             </a:fld>
             <a:endParaRPr lang="en-US"/>
           </a:p>
@@ -474,7 +474,7 @@
           <a:p>
             <a:fld id="{3C272F55-3C83-4506-9898-EE46A81079BC}" type="datetimeFigureOut">
               <a:rPr lang="en-US" smtClean="0"/>
-              <a:t>10/25/2015</a:t>
+              <a:t>12/1/2015</a:t>
             </a:fld>
             <a:endParaRPr lang="en-US"/>
           </a:p>
@@ -564,8 +564,8 @@
         </p:nvSpPr>
         <p:spPr>
           <a:xfrm>
-            <a:off x="4309110" y="91547"/>
-            <a:ext cx="1337310" cy="1950508"/>
+            <a:off x="4972050" y="91547"/>
+            <a:ext cx="1543050" cy="1950508"/>
           </a:xfrm>
         </p:spPr>
         <p:txBody>
@@ -592,8 +592,8 @@
         </p:nvSpPr>
         <p:spPr>
           <a:xfrm>
-            <a:off x="297180" y="91547"/>
-            <a:ext cx="3912870" cy="1950508"/>
+            <a:off x="342900" y="91547"/>
+            <a:ext cx="4514850" cy="1950508"/>
           </a:xfrm>
         </p:spPr>
         <p:txBody>
@@ -654,7 +654,7 @@
           <a:p>
             <a:fld id="{3C272F55-3C83-4506-9898-EE46A81079BC}" type="datetimeFigureOut">
               <a:rPr lang="en-US" smtClean="0"/>
-              <a:t>10/25/2015</a:t>
+              <a:t>12/1/2015</a:t>
             </a:fld>
             <a:endParaRPr lang="en-US"/>
           </a:p>
@@ -824,7 +824,7 @@
           <a:p>
             <a:fld id="{3C272F55-3C83-4506-9898-EE46A81079BC}" type="datetimeFigureOut">
               <a:rPr lang="en-US" smtClean="0"/>
-              <a:t>10/25/2015</a:t>
+              <a:t>12/1/2015</a:t>
             </a:fld>
             <a:endParaRPr lang="en-US"/>
           </a:p>
@@ -914,15 +914,15 @@
         </p:nvSpPr>
         <p:spPr>
           <a:xfrm>
-            <a:off x="469503" y="1468969"/>
-            <a:ext cx="5052060" cy="454025"/>
+            <a:off x="541734" y="1468970"/>
+            <a:ext cx="5829300" cy="454025"/>
           </a:xfrm>
         </p:spPr>
         <p:txBody>
           <a:bodyPr anchor="t"/>
           <a:lstStyle>
             <a:lvl1pPr algn="l">
-              <a:defRPr sz="2300" b="1" cap="all"/>
+              <a:defRPr sz="2654" b="1" cap="all"/>
             </a:lvl1pPr>
           </a:lstStyle>
           <a:p>
@@ -946,8 +946,8 @@
         </p:nvSpPr>
         <p:spPr>
           <a:xfrm>
-            <a:off x="469503" y="968906"/>
-            <a:ext cx="5052060" cy="500063"/>
+            <a:off x="541734" y="968907"/>
+            <a:ext cx="5829300" cy="500063"/>
           </a:xfrm>
         </p:spPr>
         <p:txBody>
@@ -955,7 +955,7 @@
           <a:lstStyle>
             <a:lvl1pPr marL="0" indent="0">
               <a:buNone/>
-              <a:defRPr sz="1100">
+              <a:defRPr sz="1269">
                 <a:solidFill>
                   <a:schemeClr val="tx1">
                     <a:tint val="75000"/>
@@ -963,9 +963,9 @@
                 </a:solidFill>
               </a:defRPr>
             </a:lvl1pPr>
-            <a:lvl2pPr marL="261244" indent="0">
-              <a:buNone/>
-              <a:defRPr sz="1000">
+            <a:lvl2pPr marL="301423" indent="0">
+              <a:buNone/>
+              <a:defRPr sz="1154">
                 <a:solidFill>
                   <a:schemeClr val="tx1">
                     <a:tint val="75000"/>
@@ -973,9 +973,9 @@
                 </a:solidFill>
               </a:defRPr>
             </a:lvl2pPr>
-            <a:lvl3pPr marL="522488" indent="0">
-              <a:buNone/>
-              <a:defRPr sz="900">
+            <a:lvl3pPr marL="602847" indent="0">
+              <a:buNone/>
+              <a:defRPr sz="1038">
                 <a:solidFill>
                   <a:schemeClr val="tx1">
                     <a:tint val="75000"/>
@@ -983,9 +983,9 @@
                 </a:solidFill>
               </a:defRPr>
             </a:lvl3pPr>
-            <a:lvl4pPr marL="783732" indent="0">
-              <a:buNone/>
-              <a:defRPr sz="800">
+            <a:lvl4pPr marL="904270" indent="0">
+              <a:buNone/>
+              <a:defRPr sz="923">
                 <a:solidFill>
                   <a:schemeClr val="tx1">
                     <a:tint val="75000"/>
@@ -993,9 +993,9 @@
                 </a:solidFill>
               </a:defRPr>
             </a:lvl4pPr>
-            <a:lvl5pPr marL="1044976" indent="0">
-              <a:buNone/>
-              <a:defRPr sz="800">
+            <a:lvl5pPr marL="1205693" indent="0">
+              <a:buNone/>
+              <a:defRPr sz="923">
                 <a:solidFill>
                   <a:schemeClr val="tx1">
                     <a:tint val="75000"/>
@@ -1003,9 +1003,9 @@
                 </a:solidFill>
               </a:defRPr>
             </a:lvl5pPr>
-            <a:lvl6pPr marL="1306220" indent="0">
-              <a:buNone/>
-              <a:defRPr sz="800">
+            <a:lvl6pPr marL="1507117" indent="0">
+              <a:buNone/>
+              <a:defRPr sz="923">
                 <a:solidFill>
                   <a:schemeClr val="tx1">
                     <a:tint val="75000"/>
@@ -1013,9 +1013,9 @@
                 </a:solidFill>
               </a:defRPr>
             </a:lvl6pPr>
-            <a:lvl7pPr marL="1567464" indent="0">
-              <a:buNone/>
-              <a:defRPr sz="800">
+            <a:lvl7pPr marL="1808540" indent="0">
+              <a:buNone/>
+              <a:defRPr sz="923">
                 <a:solidFill>
                   <a:schemeClr val="tx1">
                     <a:tint val="75000"/>
@@ -1023,9 +1023,9 @@
                 </a:solidFill>
               </a:defRPr>
             </a:lvl7pPr>
-            <a:lvl8pPr marL="1828709" indent="0">
-              <a:buNone/>
-              <a:defRPr sz="800">
+            <a:lvl8pPr marL="2109964" indent="0">
+              <a:buNone/>
+              <a:defRPr sz="923">
                 <a:solidFill>
                   <a:schemeClr val="tx1">
                     <a:tint val="75000"/>
@@ -1033,9 +1033,9 @@
                 </a:solidFill>
               </a:defRPr>
             </a:lvl8pPr>
-            <a:lvl9pPr marL="2089953" indent="0">
-              <a:buNone/>
-              <a:defRPr sz="800">
+            <a:lvl9pPr marL="2411388" indent="0">
+              <a:buNone/>
+              <a:defRPr sz="923">
                 <a:solidFill>
                   <a:schemeClr val="tx1">
                     <a:tint val="75000"/>
@@ -1070,7 +1070,7 @@
           <a:p>
             <a:fld id="{3C272F55-3C83-4506-9898-EE46A81079BC}" type="datetimeFigureOut">
               <a:rPr lang="en-US" smtClean="0"/>
-              <a:t>10/25/2015</a:t>
+              <a:t>12/1/2015</a:t>
             </a:fld>
             <a:endParaRPr lang="en-US"/>
           </a:p>
@@ -1183,39 +1183,39 @@
         </p:nvSpPr>
         <p:spPr>
           <a:xfrm>
-            <a:off x="297180" y="533402"/>
-            <a:ext cx="2625090" cy="1508655"/>
+            <a:off x="342900" y="533403"/>
+            <a:ext cx="3028950" cy="1508655"/>
           </a:xfrm>
         </p:spPr>
         <p:txBody>
           <a:bodyPr/>
           <a:lstStyle>
             <a:lvl1pPr>
-              <a:defRPr sz="1600"/>
+              <a:defRPr sz="1846"/>
             </a:lvl1pPr>
             <a:lvl2pPr>
-              <a:defRPr sz="1400"/>
+              <a:defRPr sz="1615"/>
             </a:lvl2pPr>
             <a:lvl3pPr>
-              <a:defRPr sz="1100"/>
+              <a:defRPr sz="1269"/>
             </a:lvl3pPr>
             <a:lvl4pPr>
-              <a:defRPr sz="1000"/>
+              <a:defRPr sz="1154"/>
             </a:lvl4pPr>
             <a:lvl5pPr>
-              <a:defRPr sz="1000"/>
+              <a:defRPr sz="1154"/>
             </a:lvl5pPr>
             <a:lvl6pPr>
-              <a:defRPr sz="1000"/>
+              <a:defRPr sz="1154"/>
             </a:lvl6pPr>
             <a:lvl7pPr>
-              <a:defRPr sz="1000"/>
+              <a:defRPr sz="1154"/>
             </a:lvl7pPr>
             <a:lvl8pPr>
-              <a:defRPr sz="1000"/>
+              <a:defRPr sz="1154"/>
             </a:lvl8pPr>
             <a:lvl9pPr>
-              <a:defRPr sz="1000"/>
+              <a:defRPr sz="1154"/>
             </a:lvl9pPr>
           </a:lstStyle>
           <a:p>
@@ -1268,39 +1268,39 @@
         </p:nvSpPr>
         <p:spPr>
           <a:xfrm>
-            <a:off x="3021330" y="533402"/>
-            <a:ext cx="2625090" cy="1508655"/>
+            <a:off x="3486150" y="533403"/>
+            <a:ext cx="3028950" cy="1508655"/>
           </a:xfrm>
         </p:spPr>
         <p:txBody>
           <a:bodyPr/>
           <a:lstStyle>
             <a:lvl1pPr>
-              <a:defRPr sz="1600"/>
+              <a:defRPr sz="1846"/>
             </a:lvl1pPr>
             <a:lvl2pPr>
-              <a:defRPr sz="1400"/>
+              <a:defRPr sz="1615"/>
             </a:lvl2pPr>
             <a:lvl3pPr>
-              <a:defRPr sz="1100"/>
+              <a:defRPr sz="1269"/>
             </a:lvl3pPr>
             <a:lvl4pPr>
-              <a:defRPr sz="1000"/>
+              <a:defRPr sz="1154"/>
             </a:lvl4pPr>
             <a:lvl5pPr>
-              <a:defRPr sz="1000"/>
+              <a:defRPr sz="1154"/>
             </a:lvl5pPr>
             <a:lvl6pPr>
-              <a:defRPr sz="1000"/>
+              <a:defRPr sz="1154"/>
             </a:lvl6pPr>
             <a:lvl7pPr>
-              <a:defRPr sz="1000"/>
+              <a:defRPr sz="1154"/>
             </a:lvl7pPr>
             <a:lvl8pPr>
-              <a:defRPr sz="1000"/>
+              <a:defRPr sz="1154"/>
             </a:lvl8pPr>
             <a:lvl9pPr>
-              <a:defRPr sz="1000"/>
+              <a:defRPr sz="1154"/>
             </a:lvl9pPr>
           </a:lstStyle>
           <a:p>
@@ -1358,7 +1358,7 @@
           <a:p>
             <a:fld id="{3C272F55-3C83-4506-9898-EE46A81079BC}" type="datetimeFigureOut">
               <a:rPr lang="en-US" smtClean="0"/>
-              <a:t>10/25/2015</a:t>
+              <a:t>12/1/2015</a:t>
             </a:fld>
             <a:endParaRPr lang="en-US"/>
           </a:p>
@@ -1475,8 +1475,8 @@
         </p:nvSpPr>
         <p:spPr>
           <a:xfrm>
-            <a:off x="297183" y="511705"/>
-            <a:ext cx="2626123" cy="213254"/>
+            <a:off x="342904" y="511705"/>
+            <a:ext cx="3030142" cy="213254"/>
           </a:xfrm>
         </p:spPr>
         <p:txBody>
@@ -1484,39 +1484,39 @@
           <a:lstStyle>
             <a:lvl1pPr marL="0" indent="0">
               <a:buNone/>
-              <a:defRPr sz="1400" b="1"/>
+              <a:defRPr sz="1615" b="1"/>
             </a:lvl1pPr>
-            <a:lvl2pPr marL="261244" indent="0">
-              <a:buNone/>
-              <a:defRPr sz="1100" b="1"/>
+            <a:lvl2pPr marL="301423" indent="0">
+              <a:buNone/>
+              <a:defRPr sz="1269" b="1"/>
             </a:lvl2pPr>
-            <a:lvl3pPr marL="522488" indent="0">
-              <a:buNone/>
-              <a:defRPr sz="1000" b="1"/>
+            <a:lvl3pPr marL="602847" indent="0">
+              <a:buNone/>
+              <a:defRPr sz="1154" b="1"/>
             </a:lvl3pPr>
-            <a:lvl4pPr marL="783732" indent="0">
-              <a:buNone/>
-              <a:defRPr sz="900" b="1"/>
+            <a:lvl4pPr marL="904270" indent="0">
+              <a:buNone/>
+              <a:defRPr sz="1038" b="1"/>
             </a:lvl4pPr>
-            <a:lvl5pPr marL="1044976" indent="0">
-              <a:buNone/>
-              <a:defRPr sz="900" b="1"/>
+            <a:lvl5pPr marL="1205693" indent="0">
+              <a:buNone/>
+              <a:defRPr sz="1038" b="1"/>
             </a:lvl5pPr>
-            <a:lvl6pPr marL="1306220" indent="0">
-              <a:buNone/>
-              <a:defRPr sz="900" b="1"/>
+            <a:lvl6pPr marL="1507117" indent="0">
+              <a:buNone/>
+              <a:defRPr sz="1038" b="1"/>
             </a:lvl6pPr>
-            <a:lvl7pPr marL="1567464" indent="0">
-              <a:buNone/>
-              <a:defRPr sz="900" b="1"/>
+            <a:lvl7pPr marL="1808540" indent="0">
+              <a:buNone/>
+              <a:defRPr sz="1038" b="1"/>
             </a:lvl7pPr>
-            <a:lvl8pPr marL="1828709" indent="0">
-              <a:buNone/>
-              <a:defRPr sz="900" b="1"/>
+            <a:lvl8pPr marL="2109964" indent="0">
+              <a:buNone/>
+              <a:defRPr sz="1038" b="1"/>
             </a:lvl8pPr>
-            <a:lvl9pPr marL="2089953" indent="0">
-              <a:buNone/>
-              <a:defRPr sz="900" b="1"/>
+            <a:lvl9pPr marL="2411388" indent="0">
+              <a:buNone/>
+              <a:defRPr sz="1038" b="1"/>
             </a:lvl9pPr>
           </a:lstStyle>
           <a:p>
@@ -1540,39 +1540,39 @@
         </p:nvSpPr>
         <p:spPr>
           <a:xfrm>
-            <a:off x="297183" y="724959"/>
-            <a:ext cx="2626123" cy="1317096"/>
+            <a:off x="342904" y="724959"/>
+            <a:ext cx="3030142" cy="1317096"/>
           </a:xfrm>
         </p:spPr>
         <p:txBody>
           <a:bodyPr/>
           <a:lstStyle>
             <a:lvl1pPr>
-              <a:defRPr sz="1400"/>
+              <a:defRPr sz="1615"/>
             </a:lvl1pPr>
             <a:lvl2pPr>
-              <a:defRPr sz="1100"/>
+              <a:defRPr sz="1269"/>
             </a:lvl2pPr>
             <a:lvl3pPr>
-              <a:defRPr sz="1000"/>
+              <a:defRPr sz="1154"/>
             </a:lvl3pPr>
             <a:lvl4pPr>
-              <a:defRPr sz="900"/>
+              <a:defRPr sz="1038"/>
             </a:lvl4pPr>
             <a:lvl5pPr>
-              <a:defRPr sz="900"/>
+              <a:defRPr sz="1038"/>
             </a:lvl5pPr>
             <a:lvl6pPr>
-              <a:defRPr sz="900"/>
+              <a:defRPr sz="1038"/>
             </a:lvl6pPr>
             <a:lvl7pPr>
-              <a:defRPr sz="900"/>
+              <a:defRPr sz="1038"/>
             </a:lvl7pPr>
             <a:lvl8pPr>
-              <a:defRPr sz="900"/>
+              <a:defRPr sz="1038"/>
             </a:lvl8pPr>
             <a:lvl9pPr>
-              <a:defRPr sz="900"/>
+              <a:defRPr sz="1038"/>
             </a:lvl9pPr>
           </a:lstStyle>
           <a:p>
@@ -1625,8 +1625,8 @@
         </p:nvSpPr>
         <p:spPr>
           <a:xfrm>
-            <a:off x="3019267" y="511705"/>
-            <a:ext cx="2627154" cy="213254"/>
+            <a:off x="3483769" y="511705"/>
+            <a:ext cx="3031332" cy="213254"/>
           </a:xfrm>
         </p:spPr>
         <p:txBody>
@@ -1634,39 +1634,39 @@
           <a:lstStyle>
             <a:lvl1pPr marL="0" indent="0">
               <a:buNone/>
-              <a:defRPr sz="1400" b="1"/>
+              <a:defRPr sz="1615" b="1"/>
             </a:lvl1pPr>
-            <a:lvl2pPr marL="261244" indent="0">
-              <a:buNone/>
-              <a:defRPr sz="1100" b="1"/>
+            <a:lvl2pPr marL="301423" indent="0">
+              <a:buNone/>
+              <a:defRPr sz="1269" b="1"/>
             </a:lvl2pPr>
-            <a:lvl3pPr marL="522488" indent="0">
-              <a:buNone/>
-              <a:defRPr sz="1000" b="1"/>
+            <a:lvl3pPr marL="602847" indent="0">
+              <a:buNone/>
+              <a:defRPr sz="1154" b="1"/>
             </a:lvl3pPr>
-            <a:lvl4pPr marL="783732" indent="0">
-              <a:buNone/>
-              <a:defRPr sz="900" b="1"/>
+            <a:lvl4pPr marL="904270" indent="0">
+              <a:buNone/>
+              <a:defRPr sz="1038" b="1"/>
             </a:lvl4pPr>
-            <a:lvl5pPr marL="1044976" indent="0">
-              <a:buNone/>
-              <a:defRPr sz="900" b="1"/>
+            <a:lvl5pPr marL="1205693" indent="0">
+              <a:buNone/>
+              <a:defRPr sz="1038" b="1"/>
             </a:lvl5pPr>
-            <a:lvl6pPr marL="1306220" indent="0">
-              <a:buNone/>
-              <a:defRPr sz="900" b="1"/>
+            <a:lvl6pPr marL="1507117" indent="0">
+              <a:buNone/>
+              <a:defRPr sz="1038" b="1"/>
             </a:lvl6pPr>
-            <a:lvl7pPr marL="1567464" indent="0">
-              <a:buNone/>
-              <a:defRPr sz="900" b="1"/>
+            <a:lvl7pPr marL="1808540" indent="0">
+              <a:buNone/>
+              <a:defRPr sz="1038" b="1"/>
             </a:lvl7pPr>
-            <a:lvl8pPr marL="1828709" indent="0">
-              <a:buNone/>
-              <a:defRPr sz="900" b="1"/>
+            <a:lvl8pPr marL="2109964" indent="0">
+              <a:buNone/>
+              <a:defRPr sz="1038" b="1"/>
             </a:lvl8pPr>
-            <a:lvl9pPr marL="2089953" indent="0">
-              <a:buNone/>
-              <a:defRPr sz="900" b="1"/>
+            <a:lvl9pPr marL="2411388" indent="0">
+              <a:buNone/>
+              <a:defRPr sz="1038" b="1"/>
             </a:lvl9pPr>
           </a:lstStyle>
           <a:p>
@@ -1690,39 +1690,39 @@
         </p:nvSpPr>
         <p:spPr>
           <a:xfrm>
-            <a:off x="3019267" y="724959"/>
-            <a:ext cx="2627154" cy="1317096"/>
+            <a:off x="3483769" y="724959"/>
+            <a:ext cx="3031332" cy="1317096"/>
           </a:xfrm>
         </p:spPr>
         <p:txBody>
           <a:bodyPr/>
           <a:lstStyle>
             <a:lvl1pPr>
-              <a:defRPr sz="1400"/>
+              <a:defRPr sz="1615"/>
             </a:lvl1pPr>
             <a:lvl2pPr>
-              <a:defRPr sz="1100"/>
+              <a:defRPr sz="1269"/>
             </a:lvl2pPr>
             <a:lvl3pPr>
-              <a:defRPr sz="1000"/>
+              <a:defRPr sz="1154"/>
             </a:lvl3pPr>
             <a:lvl4pPr>
-              <a:defRPr sz="900"/>
+              <a:defRPr sz="1038"/>
             </a:lvl4pPr>
             <a:lvl5pPr>
-              <a:defRPr sz="900"/>
+              <a:defRPr sz="1038"/>
             </a:lvl5pPr>
             <a:lvl6pPr>
-              <a:defRPr sz="900"/>
+              <a:defRPr sz="1038"/>
             </a:lvl6pPr>
             <a:lvl7pPr>
-              <a:defRPr sz="900"/>
+              <a:defRPr sz="1038"/>
             </a:lvl7pPr>
             <a:lvl8pPr>
-              <a:defRPr sz="900"/>
+              <a:defRPr sz="1038"/>
             </a:lvl8pPr>
             <a:lvl9pPr>
-              <a:defRPr sz="900"/>
+              <a:defRPr sz="1038"/>
             </a:lvl9pPr>
           </a:lstStyle>
           <a:p>
@@ -1780,7 +1780,7 @@
           <a:p>
             <a:fld id="{3C272F55-3C83-4506-9898-EE46A81079BC}" type="datetimeFigureOut">
               <a:rPr lang="en-US" smtClean="0"/>
-              <a:t>10/25/2015</a:t>
+              <a:t>12/1/2015</a:t>
             </a:fld>
             <a:endParaRPr lang="en-US"/>
           </a:p>
@@ -1898,7 +1898,7 @@
           <a:p>
             <a:fld id="{3C272F55-3C83-4506-9898-EE46A81079BC}" type="datetimeFigureOut">
               <a:rPr lang="en-US" smtClean="0"/>
-              <a:t>10/25/2015</a:t>
+              <a:t>12/1/2015</a:t>
             </a:fld>
             <a:endParaRPr lang="en-US"/>
           </a:p>
@@ -1993,7 +1993,7 @@
           <a:p>
             <a:fld id="{3C272F55-3C83-4506-9898-EE46A81079BC}" type="datetimeFigureOut">
               <a:rPr lang="en-US" smtClean="0"/>
-              <a:t>10/25/2015</a:t>
+              <a:t>12/1/2015</a:t>
             </a:fld>
             <a:endParaRPr lang="en-US"/>
           </a:p>
@@ -2083,15 +2083,15 @@
         </p:nvSpPr>
         <p:spPr>
           <a:xfrm>
-            <a:off x="297181" y="91016"/>
-            <a:ext cx="1955403" cy="387350"/>
+            <a:off x="342902" y="91016"/>
+            <a:ext cx="2256234" cy="387350"/>
           </a:xfrm>
         </p:spPr>
         <p:txBody>
           <a:bodyPr anchor="b"/>
           <a:lstStyle>
             <a:lvl1pPr algn="l">
-              <a:defRPr sz="1100" b="1"/>
+              <a:defRPr sz="1269" b="1"/>
             </a:lvl1pPr>
           </a:lstStyle>
           <a:p>
@@ -2115,39 +2115,39 @@
         </p:nvSpPr>
         <p:spPr>
           <a:xfrm>
-            <a:off x="2323783" y="91019"/>
-            <a:ext cx="3322638" cy="1951037"/>
+            <a:off x="2681288" y="91020"/>
+            <a:ext cx="3833813" cy="1951037"/>
           </a:xfrm>
         </p:spPr>
         <p:txBody>
           <a:bodyPr/>
           <a:lstStyle>
             <a:lvl1pPr>
-              <a:defRPr sz="1800"/>
+              <a:defRPr sz="2077"/>
             </a:lvl1pPr>
             <a:lvl2pPr>
-              <a:defRPr sz="1600"/>
+              <a:defRPr sz="1846"/>
             </a:lvl2pPr>
             <a:lvl3pPr>
-              <a:defRPr sz="1400"/>
+              <a:defRPr sz="1615"/>
             </a:lvl3pPr>
             <a:lvl4pPr>
-              <a:defRPr sz="1100"/>
+              <a:defRPr sz="1269"/>
             </a:lvl4pPr>
             <a:lvl5pPr>
-              <a:defRPr sz="1100"/>
+              <a:defRPr sz="1269"/>
             </a:lvl5pPr>
             <a:lvl6pPr>
-              <a:defRPr sz="1100"/>
+              <a:defRPr sz="1269"/>
             </a:lvl6pPr>
             <a:lvl7pPr>
-              <a:defRPr sz="1100"/>
+              <a:defRPr sz="1269"/>
             </a:lvl7pPr>
             <a:lvl8pPr>
-              <a:defRPr sz="1100"/>
+              <a:defRPr sz="1269"/>
             </a:lvl8pPr>
             <a:lvl9pPr>
-              <a:defRPr sz="1100"/>
+              <a:defRPr sz="1269"/>
             </a:lvl9pPr>
           </a:lstStyle>
           <a:p>
@@ -2200,8 +2200,8 @@
         </p:nvSpPr>
         <p:spPr>
           <a:xfrm>
-            <a:off x="297181" y="478370"/>
-            <a:ext cx="1955403" cy="1563687"/>
+            <a:off x="342902" y="478371"/>
+            <a:ext cx="2256234" cy="1563687"/>
           </a:xfrm>
         </p:spPr>
         <p:txBody>
@@ -2209,39 +2209,39 @@
           <a:lstStyle>
             <a:lvl1pPr marL="0" indent="0">
               <a:buNone/>
-              <a:defRPr sz="800"/>
+              <a:defRPr sz="923"/>
             </a:lvl1pPr>
-            <a:lvl2pPr marL="261244" indent="0">
-              <a:buNone/>
-              <a:defRPr sz="700"/>
+            <a:lvl2pPr marL="301423" indent="0">
+              <a:buNone/>
+              <a:defRPr sz="808"/>
             </a:lvl2pPr>
-            <a:lvl3pPr marL="522488" indent="0">
-              <a:buNone/>
-              <a:defRPr sz="600"/>
+            <a:lvl3pPr marL="602847" indent="0">
+              <a:buNone/>
+              <a:defRPr sz="692"/>
             </a:lvl3pPr>
-            <a:lvl4pPr marL="783732" indent="0">
-              <a:buNone/>
-              <a:defRPr sz="500"/>
+            <a:lvl4pPr marL="904270" indent="0">
+              <a:buNone/>
+              <a:defRPr sz="577"/>
             </a:lvl4pPr>
-            <a:lvl5pPr marL="1044976" indent="0">
-              <a:buNone/>
-              <a:defRPr sz="500"/>
+            <a:lvl5pPr marL="1205693" indent="0">
+              <a:buNone/>
+              <a:defRPr sz="577"/>
             </a:lvl5pPr>
-            <a:lvl6pPr marL="1306220" indent="0">
-              <a:buNone/>
-              <a:defRPr sz="500"/>
+            <a:lvl6pPr marL="1507117" indent="0">
+              <a:buNone/>
+              <a:defRPr sz="577"/>
             </a:lvl6pPr>
-            <a:lvl7pPr marL="1567464" indent="0">
-              <a:buNone/>
-              <a:defRPr sz="500"/>
+            <a:lvl7pPr marL="1808540" indent="0">
+              <a:buNone/>
+              <a:defRPr sz="577"/>
             </a:lvl7pPr>
-            <a:lvl8pPr marL="1828709" indent="0">
-              <a:buNone/>
-              <a:defRPr sz="500"/>
+            <a:lvl8pPr marL="2109964" indent="0">
+              <a:buNone/>
+              <a:defRPr sz="577"/>
             </a:lvl8pPr>
-            <a:lvl9pPr marL="2089953" indent="0">
-              <a:buNone/>
-              <a:defRPr sz="500"/>
+            <a:lvl9pPr marL="2411388" indent="0">
+              <a:buNone/>
+              <a:defRPr sz="577"/>
             </a:lvl9pPr>
           </a:lstStyle>
           <a:p>
@@ -2270,7 +2270,7 @@
           <a:p>
             <a:fld id="{3C272F55-3C83-4506-9898-EE46A81079BC}" type="datetimeFigureOut">
               <a:rPr lang="en-US" smtClean="0"/>
-              <a:t>10/25/2015</a:t>
+              <a:t>12/1/2015</a:t>
             </a:fld>
             <a:endParaRPr lang="en-US"/>
           </a:p>
@@ -2360,15 +2360,15 @@
         </p:nvSpPr>
         <p:spPr>
           <a:xfrm>
-            <a:off x="1164988" y="1600202"/>
-            <a:ext cx="3566160" cy="188913"/>
+            <a:off x="1344217" y="1600203"/>
+            <a:ext cx="4114800" cy="188913"/>
           </a:xfrm>
         </p:spPr>
         <p:txBody>
           <a:bodyPr anchor="b"/>
           <a:lstStyle>
             <a:lvl1pPr algn="l">
-              <a:defRPr sz="1100" b="1"/>
+              <a:defRPr sz="1269" b="1"/>
             </a:lvl1pPr>
           </a:lstStyle>
           <a:p>
@@ -2392,8 +2392,8 @@
         </p:nvSpPr>
         <p:spPr>
           <a:xfrm>
-            <a:off x="1164988" y="204258"/>
-            <a:ext cx="3566160" cy="1371600"/>
+            <a:off x="1344217" y="204258"/>
+            <a:ext cx="4114800" cy="1371600"/>
           </a:xfrm>
         </p:spPr>
         <p:txBody>
@@ -2401,39 +2401,39 @@
           <a:lstStyle>
             <a:lvl1pPr marL="0" indent="0">
               <a:buNone/>
-              <a:defRPr sz="1800"/>
+              <a:defRPr sz="2077"/>
             </a:lvl1pPr>
-            <a:lvl2pPr marL="261244" indent="0">
-              <a:buNone/>
-              <a:defRPr sz="1600"/>
+            <a:lvl2pPr marL="301423" indent="0">
+              <a:buNone/>
+              <a:defRPr sz="1846"/>
             </a:lvl2pPr>
-            <a:lvl3pPr marL="522488" indent="0">
-              <a:buNone/>
-              <a:defRPr sz="1400"/>
+            <a:lvl3pPr marL="602847" indent="0">
+              <a:buNone/>
+              <a:defRPr sz="1615"/>
             </a:lvl3pPr>
-            <a:lvl4pPr marL="783732" indent="0">
-              <a:buNone/>
-              <a:defRPr sz="1100"/>
+            <a:lvl4pPr marL="904270" indent="0">
+              <a:buNone/>
+              <a:defRPr sz="1269"/>
             </a:lvl4pPr>
-            <a:lvl5pPr marL="1044976" indent="0">
-              <a:buNone/>
-              <a:defRPr sz="1100"/>
+            <a:lvl5pPr marL="1205693" indent="0">
+              <a:buNone/>
+              <a:defRPr sz="1269"/>
             </a:lvl5pPr>
-            <a:lvl6pPr marL="1306220" indent="0">
-              <a:buNone/>
-              <a:defRPr sz="1100"/>
+            <a:lvl6pPr marL="1507117" indent="0">
+              <a:buNone/>
+              <a:defRPr sz="1269"/>
             </a:lvl6pPr>
-            <a:lvl7pPr marL="1567464" indent="0">
-              <a:buNone/>
-              <a:defRPr sz="1100"/>
+            <a:lvl7pPr marL="1808540" indent="0">
+              <a:buNone/>
+              <a:defRPr sz="1269"/>
             </a:lvl7pPr>
-            <a:lvl8pPr marL="1828709" indent="0">
-              <a:buNone/>
-              <a:defRPr sz="1100"/>
+            <a:lvl8pPr marL="2109964" indent="0">
+              <a:buNone/>
+              <a:defRPr sz="1269"/>
             </a:lvl8pPr>
-            <a:lvl9pPr marL="2089953" indent="0">
-              <a:buNone/>
-              <a:defRPr sz="1100"/>
+            <a:lvl9pPr marL="2411388" indent="0">
+              <a:buNone/>
+              <a:defRPr sz="1269"/>
             </a:lvl9pPr>
           </a:lstStyle>
           <a:p>
@@ -2453,8 +2453,8 @@
         </p:nvSpPr>
         <p:spPr>
           <a:xfrm>
-            <a:off x="1164988" y="1789112"/>
-            <a:ext cx="3566160" cy="268288"/>
+            <a:off x="1344217" y="1789112"/>
+            <a:ext cx="4114800" cy="268288"/>
           </a:xfrm>
         </p:spPr>
         <p:txBody>
@@ -2462,39 +2462,39 @@
           <a:lstStyle>
             <a:lvl1pPr marL="0" indent="0">
               <a:buNone/>
-              <a:defRPr sz="800"/>
+              <a:defRPr sz="923"/>
             </a:lvl1pPr>
-            <a:lvl2pPr marL="261244" indent="0">
-              <a:buNone/>
-              <a:defRPr sz="700"/>
+            <a:lvl2pPr marL="301423" indent="0">
+              <a:buNone/>
+              <a:defRPr sz="808"/>
             </a:lvl2pPr>
-            <a:lvl3pPr marL="522488" indent="0">
-              <a:buNone/>
-              <a:defRPr sz="600"/>
+            <a:lvl3pPr marL="602847" indent="0">
+              <a:buNone/>
+              <a:defRPr sz="692"/>
             </a:lvl3pPr>
-            <a:lvl4pPr marL="783732" indent="0">
-              <a:buNone/>
-              <a:defRPr sz="500"/>
+            <a:lvl4pPr marL="904270" indent="0">
+              <a:buNone/>
+              <a:defRPr sz="577"/>
             </a:lvl4pPr>
-            <a:lvl5pPr marL="1044976" indent="0">
-              <a:buNone/>
-              <a:defRPr sz="500"/>
+            <a:lvl5pPr marL="1205693" indent="0">
+              <a:buNone/>
+              <a:defRPr sz="577"/>
             </a:lvl5pPr>
-            <a:lvl6pPr marL="1306220" indent="0">
-              <a:buNone/>
-              <a:defRPr sz="500"/>
+            <a:lvl6pPr marL="1507117" indent="0">
+              <a:buNone/>
+              <a:defRPr sz="577"/>
             </a:lvl6pPr>
-            <a:lvl7pPr marL="1567464" indent="0">
-              <a:buNone/>
-              <a:defRPr sz="500"/>
+            <a:lvl7pPr marL="1808540" indent="0">
+              <a:buNone/>
+              <a:defRPr sz="577"/>
             </a:lvl7pPr>
-            <a:lvl8pPr marL="1828709" indent="0">
-              <a:buNone/>
-              <a:defRPr sz="500"/>
+            <a:lvl8pPr marL="2109964" indent="0">
+              <a:buNone/>
+              <a:defRPr sz="577"/>
             </a:lvl8pPr>
-            <a:lvl9pPr marL="2089953" indent="0">
-              <a:buNone/>
-              <a:defRPr sz="500"/>
+            <a:lvl9pPr marL="2411388" indent="0">
+              <a:buNone/>
+              <a:defRPr sz="577"/>
             </a:lvl9pPr>
           </a:lstStyle>
           <a:p>
@@ -2523,7 +2523,7 @@
           <a:p>
             <a:fld id="{3C272F55-3C83-4506-9898-EE46A81079BC}" type="datetimeFigureOut">
               <a:rPr lang="en-US" smtClean="0"/>
-              <a:t>10/25/2015</a:t>
+              <a:t>12/1/2015</a:t>
             </a:fld>
             <a:endParaRPr lang="en-US"/>
           </a:p>
@@ -2618,8 +2618,8 @@
         </p:nvSpPr>
         <p:spPr>
           <a:xfrm>
-            <a:off x="297180" y="91547"/>
-            <a:ext cx="5349240" cy="381000"/>
+            <a:off x="342900" y="91547"/>
+            <a:ext cx="6172200" cy="381000"/>
           </a:xfrm>
           <a:prstGeom prst="rect">
             <a:avLst/>
@@ -2651,8 +2651,8 @@
         </p:nvSpPr>
         <p:spPr>
           <a:xfrm>
-            <a:off x="297180" y="533402"/>
-            <a:ext cx="5349240" cy="1508655"/>
+            <a:off x="342900" y="533403"/>
+            <a:ext cx="6172200" cy="1508655"/>
           </a:xfrm>
           <a:prstGeom prst="rect">
             <a:avLst/>
@@ -2713,8 +2713,8 @@
         </p:nvSpPr>
         <p:spPr>
           <a:xfrm>
-            <a:off x="297180" y="2118784"/>
-            <a:ext cx="1386840" cy="121708"/>
+            <a:off x="342900" y="2118784"/>
+            <a:ext cx="1600200" cy="121708"/>
           </a:xfrm>
           <a:prstGeom prst="rect">
             <a:avLst/>
@@ -2724,7 +2724,7 @@
           <a:bodyPr vert="horz" lIns="52249" tIns="26124" rIns="52249" bIns="26124" rtlCol="0" anchor="ctr"/>
           <a:lstStyle>
             <a:lvl1pPr algn="l">
-              <a:defRPr sz="700">
+              <a:defRPr sz="808">
                 <a:solidFill>
                   <a:schemeClr val="tx1">
                     <a:tint val="75000"/>
@@ -2736,7 +2736,7 @@
           <a:p>
             <a:fld id="{3C272F55-3C83-4506-9898-EE46A81079BC}" type="datetimeFigureOut">
               <a:rPr lang="en-US" smtClean="0"/>
-              <a:t>10/25/2015</a:t>
+              <a:t>12/1/2015</a:t>
             </a:fld>
             <a:endParaRPr lang="en-US"/>
           </a:p>
@@ -2754,8 +2754,8 @@
         </p:nvSpPr>
         <p:spPr>
           <a:xfrm>
-            <a:off x="2030730" y="2118784"/>
-            <a:ext cx="1882140" cy="121708"/>
+            <a:off x="2343150" y="2118784"/>
+            <a:ext cx="2171700" cy="121708"/>
           </a:xfrm>
           <a:prstGeom prst="rect">
             <a:avLst/>
@@ -2765,7 +2765,7 @@
           <a:bodyPr vert="horz" lIns="52249" tIns="26124" rIns="52249" bIns="26124" rtlCol="0" anchor="ctr"/>
           <a:lstStyle>
             <a:lvl1pPr algn="ctr">
-              <a:defRPr sz="700">
+              <a:defRPr sz="808">
                 <a:solidFill>
                   <a:schemeClr val="tx1">
                     <a:tint val="75000"/>
@@ -2791,8 +2791,8 @@
         </p:nvSpPr>
         <p:spPr>
           <a:xfrm>
-            <a:off x="4259580" y="2118784"/>
-            <a:ext cx="1386840" cy="121708"/>
+            <a:off x="4914900" y="2118784"/>
+            <a:ext cx="1600200" cy="121708"/>
           </a:xfrm>
           <a:prstGeom prst="rect">
             <a:avLst/>
@@ -2802,7 +2802,7 @@
           <a:bodyPr vert="horz" lIns="52249" tIns="26124" rIns="52249" bIns="26124" rtlCol="0" anchor="ctr"/>
           <a:lstStyle>
             <a:lvl1pPr algn="r">
-              <a:defRPr sz="700">
+              <a:defRPr sz="808">
                 <a:solidFill>
                   <a:schemeClr val="tx1">
                     <a:tint val="75000"/>
@@ -2843,12 +2843,12 @@
   </p:sldLayoutIdLst>
   <p:txStyles>
     <p:titleStyle>
-      <a:lvl1pPr algn="ctr" defTabSz="522488" rtl="0" eaLnBrk="1" latinLnBrk="0" hangingPunct="1">
+      <a:lvl1pPr algn="ctr" defTabSz="602847" rtl="0" eaLnBrk="1" latinLnBrk="0" hangingPunct="1">
         <a:spcBef>
           <a:spcPct val="0"/>
         </a:spcBef>
         <a:buNone/>
-        <a:defRPr sz="2500" kern="1200">
+        <a:defRPr sz="2885" kern="1200">
           <a:solidFill>
             <a:schemeClr val="tx1"/>
           </a:solidFill>
@@ -2859,13 +2859,13 @@
       </a:lvl1pPr>
     </p:titleStyle>
     <p:bodyStyle>
-      <a:lvl1pPr marL="195933" indent="-195933" algn="l" defTabSz="522488" rtl="0" eaLnBrk="1" latinLnBrk="0" hangingPunct="1">
+      <a:lvl1pPr marL="226067" indent="-226067" algn="l" defTabSz="602847" rtl="0" eaLnBrk="1" latinLnBrk="0" hangingPunct="1">
         <a:spcBef>
           <a:spcPct val="20000"/>
         </a:spcBef>
         <a:buFont typeface="Arial" pitchFamily="34" charset="0"/>
         <a:buChar char="•"/>
-        <a:defRPr sz="1800" kern="1200">
+        <a:defRPr sz="2077" kern="1200">
           <a:solidFill>
             <a:schemeClr val="tx1"/>
           </a:solidFill>
@@ -2874,13 +2874,13 @@
           <a:cs typeface="+mn-cs"/>
         </a:defRPr>
       </a:lvl1pPr>
-      <a:lvl2pPr marL="424522" indent="-163278" algn="l" defTabSz="522488" rtl="0" eaLnBrk="1" latinLnBrk="0" hangingPunct="1">
+      <a:lvl2pPr marL="489813" indent="-188390" algn="l" defTabSz="602847" rtl="0" eaLnBrk="1" latinLnBrk="0" hangingPunct="1">
         <a:spcBef>
           <a:spcPct val="20000"/>
         </a:spcBef>
         <a:buFont typeface="Arial" pitchFamily="34" charset="0"/>
         <a:buChar char="–"/>
-        <a:defRPr sz="1600" kern="1200">
+        <a:defRPr sz="1846" kern="1200">
           <a:solidFill>
             <a:schemeClr val="tx1"/>
           </a:solidFill>
@@ -2889,13 +2889,13 @@
           <a:cs typeface="+mn-cs"/>
         </a:defRPr>
       </a:lvl2pPr>
-      <a:lvl3pPr marL="653110" indent="-130622" algn="l" defTabSz="522488" rtl="0" eaLnBrk="1" latinLnBrk="0" hangingPunct="1">
+      <a:lvl3pPr marL="753558" indent="-150712" algn="l" defTabSz="602847" rtl="0" eaLnBrk="1" latinLnBrk="0" hangingPunct="1">
         <a:spcBef>
           <a:spcPct val="20000"/>
         </a:spcBef>
         <a:buFont typeface="Arial" pitchFamily="34" charset="0"/>
         <a:buChar char="•"/>
-        <a:defRPr sz="1400" kern="1200">
+        <a:defRPr sz="1615" kern="1200">
           <a:solidFill>
             <a:schemeClr val="tx1"/>
           </a:solidFill>
@@ -2904,13 +2904,13 @@
           <a:cs typeface="+mn-cs"/>
         </a:defRPr>
       </a:lvl3pPr>
-      <a:lvl4pPr marL="914354" indent="-130622" algn="l" defTabSz="522488" rtl="0" eaLnBrk="1" latinLnBrk="0" hangingPunct="1">
+      <a:lvl4pPr marL="1054982" indent="-150712" algn="l" defTabSz="602847" rtl="0" eaLnBrk="1" latinLnBrk="0" hangingPunct="1">
         <a:spcBef>
           <a:spcPct val="20000"/>
         </a:spcBef>
         <a:buFont typeface="Arial" pitchFamily="34" charset="0"/>
         <a:buChar char="–"/>
-        <a:defRPr sz="1100" kern="1200">
+        <a:defRPr sz="1269" kern="1200">
           <a:solidFill>
             <a:schemeClr val="tx1"/>
           </a:solidFill>
@@ -2919,13 +2919,13 @@
           <a:cs typeface="+mn-cs"/>
         </a:defRPr>
       </a:lvl4pPr>
-      <a:lvl5pPr marL="1175598" indent="-130622" algn="l" defTabSz="522488" rtl="0" eaLnBrk="1" latinLnBrk="0" hangingPunct="1">
+      <a:lvl5pPr marL="1356405" indent="-150712" algn="l" defTabSz="602847" rtl="0" eaLnBrk="1" latinLnBrk="0" hangingPunct="1">
         <a:spcBef>
           <a:spcPct val="20000"/>
         </a:spcBef>
         <a:buFont typeface="Arial" pitchFamily="34" charset="0"/>
         <a:buChar char="»"/>
-        <a:defRPr sz="1100" kern="1200">
+        <a:defRPr sz="1269" kern="1200">
           <a:solidFill>
             <a:schemeClr val="tx1"/>
           </a:solidFill>
@@ -2934,13 +2934,13 @@
           <a:cs typeface="+mn-cs"/>
         </a:defRPr>
       </a:lvl5pPr>
-      <a:lvl6pPr marL="1436842" indent="-130622" algn="l" defTabSz="522488" rtl="0" eaLnBrk="1" latinLnBrk="0" hangingPunct="1">
+      <a:lvl6pPr marL="1657828" indent="-150712" algn="l" defTabSz="602847" rtl="0" eaLnBrk="1" latinLnBrk="0" hangingPunct="1">
         <a:spcBef>
           <a:spcPct val="20000"/>
         </a:spcBef>
         <a:buFont typeface="Arial" pitchFamily="34" charset="0"/>
         <a:buChar char="•"/>
-        <a:defRPr sz="1100" kern="1200">
+        <a:defRPr sz="1269" kern="1200">
           <a:solidFill>
             <a:schemeClr val="tx1"/>
           </a:solidFill>
@@ -2949,13 +2949,13 @@
           <a:cs typeface="+mn-cs"/>
         </a:defRPr>
       </a:lvl6pPr>
-      <a:lvl7pPr marL="1698087" indent="-130622" algn="l" defTabSz="522488" rtl="0" eaLnBrk="1" latinLnBrk="0" hangingPunct="1">
+      <a:lvl7pPr marL="1959253" indent="-150712" algn="l" defTabSz="602847" rtl="0" eaLnBrk="1" latinLnBrk="0" hangingPunct="1">
         <a:spcBef>
           <a:spcPct val="20000"/>
         </a:spcBef>
         <a:buFont typeface="Arial" pitchFamily="34" charset="0"/>
         <a:buChar char="•"/>
-        <a:defRPr sz="1100" kern="1200">
+        <a:defRPr sz="1269" kern="1200">
           <a:solidFill>
             <a:schemeClr val="tx1"/>
           </a:solidFill>
@@ -2964,13 +2964,13 @@
           <a:cs typeface="+mn-cs"/>
         </a:defRPr>
       </a:lvl7pPr>
-      <a:lvl8pPr marL="1959331" indent="-130622" algn="l" defTabSz="522488" rtl="0" eaLnBrk="1" latinLnBrk="0" hangingPunct="1">
+      <a:lvl8pPr marL="2260676" indent="-150712" algn="l" defTabSz="602847" rtl="0" eaLnBrk="1" latinLnBrk="0" hangingPunct="1">
         <a:spcBef>
           <a:spcPct val="20000"/>
         </a:spcBef>
         <a:buFont typeface="Arial" pitchFamily="34" charset="0"/>
         <a:buChar char="•"/>
-        <a:defRPr sz="1100" kern="1200">
+        <a:defRPr sz="1269" kern="1200">
           <a:solidFill>
             <a:schemeClr val="tx1"/>
           </a:solidFill>
@@ -2979,13 +2979,13 @@
           <a:cs typeface="+mn-cs"/>
         </a:defRPr>
       </a:lvl8pPr>
-      <a:lvl9pPr marL="2220575" indent="-130622" algn="l" defTabSz="522488" rtl="0" eaLnBrk="1" latinLnBrk="0" hangingPunct="1">
+      <a:lvl9pPr marL="2562099" indent="-150712" algn="l" defTabSz="602847" rtl="0" eaLnBrk="1" latinLnBrk="0" hangingPunct="1">
         <a:spcBef>
           <a:spcPct val="20000"/>
         </a:spcBef>
         <a:buFont typeface="Arial" pitchFamily="34" charset="0"/>
         <a:buChar char="•"/>
-        <a:defRPr sz="1100" kern="1200">
+        <a:defRPr sz="1269" kern="1200">
           <a:solidFill>
             <a:schemeClr val="tx1"/>
           </a:solidFill>
@@ -2999,8 +2999,8 @@
       <a:defPPr>
         <a:defRPr lang="en-US"/>
       </a:defPPr>
-      <a:lvl1pPr marL="0" algn="l" defTabSz="522488" rtl="0" eaLnBrk="1" latinLnBrk="0" hangingPunct="1">
-        <a:defRPr sz="1000" kern="1200">
+      <a:lvl1pPr marL="0" algn="l" defTabSz="602847" rtl="0" eaLnBrk="1" latinLnBrk="0" hangingPunct="1">
+        <a:defRPr sz="1154" kern="1200">
           <a:solidFill>
             <a:schemeClr val="tx1"/>
           </a:solidFill>
@@ -3009,8 +3009,8 @@
           <a:cs typeface="+mn-cs"/>
         </a:defRPr>
       </a:lvl1pPr>
-      <a:lvl2pPr marL="261244" algn="l" defTabSz="522488" rtl="0" eaLnBrk="1" latinLnBrk="0" hangingPunct="1">
-        <a:defRPr sz="1000" kern="1200">
+      <a:lvl2pPr marL="301423" algn="l" defTabSz="602847" rtl="0" eaLnBrk="1" latinLnBrk="0" hangingPunct="1">
+        <a:defRPr sz="1154" kern="1200">
           <a:solidFill>
             <a:schemeClr val="tx1"/>
           </a:solidFill>
@@ -3019,8 +3019,8 @@
           <a:cs typeface="+mn-cs"/>
         </a:defRPr>
       </a:lvl2pPr>
-      <a:lvl3pPr marL="522488" algn="l" defTabSz="522488" rtl="0" eaLnBrk="1" latinLnBrk="0" hangingPunct="1">
-        <a:defRPr sz="1000" kern="1200">
+      <a:lvl3pPr marL="602847" algn="l" defTabSz="602847" rtl="0" eaLnBrk="1" latinLnBrk="0" hangingPunct="1">
+        <a:defRPr sz="1154" kern="1200">
           <a:solidFill>
             <a:schemeClr val="tx1"/>
           </a:solidFill>
@@ -3029,8 +3029,8 @@
           <a:cs typeface="+mn-cs"/>
         </a:defRPr>
       </a:lvl3pPr>
-      <a:lvl4pPr marL="783732" algn="l" defTabSz="522488" rtl="0" eaLnBrk="1" latinLnBrk="0" hangingPunct="1">
-        <a:defRPr sz="1000" kern="1200">
+      <a:lvl4pPr marL="904270" algn="l" defTabSz="602847" rtl="0" eaLnBrk="1" latinLnBrk="0" hangingPunct="1">
+        <a:defRPr sz="1154" kern="1200">
           <a:solidFill>
             <a:schemeClr val="tx1"/>
           </a:solidFill>
@@ -3039,8 +3039,8 @@
           <a:cs typeface="+mn-cs"/>
         </a:defRPr>
       </a:lvl4pPr>
-      <a:lvl5pPr marL="1044976" algn="l" defTabSz="522488" rtl="0" eaLnBrk="1" latinLnBrk="0" hangingPunct="1">
-        <a:defRPr sz="1000" kern="1200">
+      <a:lvl5pPr marL="1205693" algn="l" defTabSz="602847" rtl="0" eaLnBrk="1" latinLnBrk="0" hangingPunct="1">
+        <a:defRPr sz="1154" kern="1200">
           <a:solidFill>
             <a:schemeClr val="tx1"/>
           </a:solidFill>
@@ -3049,8 +3049,8 @@
           <a:cs typeface="+mn-cs"/>
         </a:defRPr>
       </a:lvl5pPr>
-      <a:lvl6pPr marL="1306220" algn="l" defTabSz="522488" rtl="0" eaLnBrk="1" latinLnBrk="0" hangingPunct="1">
-        <a:defRPr sz="1000" kern="1200">
+      <a:lvl6pPr marL="1507117" algn="l" defTabSz="602847" rtl="0" eaLnBrk="1" latinLnBrk="0" hangingPunct="1">
+        <a:defRPr sz="1154" kern="1200">
           <a:solidFill>
             <a:schemeClr val="tx1"/>
           </a:solidFill>
@@ -3059,8 +3059,8 @@
           <a:cs typeface="+mn-cs"/>
         </a:defRPr>
       </a:lvl6pPr>
-      <a:lvl7pPr marL="1567464" algn="l" defTabSz="522488" rtl="0" eaLnBrk="1" latinLnBrk="0" hangingPunct="1">
-        <a:defRPr sz="1000" kern="1200">
+      <a:lvl7pPr marL="1808540" algn="l" defTabSz="602847" rtl="0" eaLnBrk="1" latinLnBrk="0" hangingPunct="1">
+        <a:defRPr sz="1154" kern="1200">
           <a:solidFill>
             <a:schemeClr val="tx1"/>
           </a:solidFill>
@@ -3069,8 +3069,8 @@
           <a:cs typeface="+mn-cs"/>
         </a:defRPr>
       </a:lvl7pPr>
-      <a:lvl8pPr marL="1828709" algn="l" defTabSz="522488" rtl="0" eaLnBrk="1" latinLnBrk="0" hangingPunct="1">
-        <a:defRPr sz="1000" kern="1200">
+      <a:lvl8pPr marL="2109964" algn="l" defTabSz="602847" rtl="0" eaLnBrk="1" latinLnBrk="0" hangingPunct="1">
+        <a:defRPr sz="1154" kern="1200">
           <a:solidFill>
             <a:schemeClr val="tx1"/>
           </a:solidFill>
@@ -3079,8 +3079,8 @@
           <a:cs typeface="+mn-cs"/>
         </a:defRPr>
       </a:lvl8pPr>
-      <a:lvl9pPr marL="2089953" algn="l" defTabSz="522488" rtl="0" eaLnBrk="1" latinLnBrk="0" hangingPunct="1">
-        <a:defRPr sz="1000" kern="1200">
+      <a:lvl9pPr marL="2411388" algn="l" defTabSz="602847" rtl="0" eaLnBrk="1" latinLnBrk="0" hangingPunct="1">
+        <a:defRPr sz="1154" kern="1200">
           <a:solidFill>
             <a:schemeClr val="tx1"/>
           </a:solidFill>
@@ -3113,14 +3113,14 @@
       </p:grpSpPr>
       <p:sp>
         <p:nvSpPr>
-          <p:cNvPr id="31" name="Rectangle 30"/>
+          <p:cNvPr id="91" name="Rectangle 90"/>
           <p:cNvSpPr/>
           <p:nvPr/>
         </p:nvSpPr>
         <p:spPr>
           <a:xfrm>
-            <a:off x="1600201" y="164742"/>
-            <a:ext cx="2438400" cy="731520"/>
+            <a:off x="1905001" y="164742"/>
+            <a:ext cx="2590799" cy="731520"/>
           </a:xfrm>
           <a:prstGeom prst="rect">
             <a:avLst/>
@@ -3156,7 +3156,7 @@
           <a:lstStyle/>
           <a:p>
             <a:pPr algn="ctr"/>
-            <a:endParaRPr lang="en-US" sz="1100">
+            <a:endParaRPr lang="en-US">
               <a:latin typeface="NimbusRomNo9L" panose="01010103010101010101" pitchFamily="2" charset="0"/>
             </a:endParaRPr>
           </a:p>
@@ -3164,14 +3164,14 @@
       </p:sp>
       <p:sp>
         <p:nvSpPr>
-          <p:cNvPr id="32" name="Rectangle 31"/>
+          <p:cNvPr id="92" name="Rectangle 91"/>
           <p:cNvSpPr/>
           <p:nvPr/>
         </p:nvSpPr>
         <p:spPr>
           <a:xfrm>
-            <a:off x="1200691" y="1366429"/>
-            <a:ext cx="2667000" cy="731520"/>
+            <a:off x="2240028" y="1366429"/>
+            <a:ext cx="2712972" cy="731520"/>
           </a:xfrm>
           <a:prstGeom prst="rect">
             <a:avLst/>
@@ -3207,7 +3207,7 @@
           <a:lstStyle/>
           <a:p>
             <a:pPr algn="ctr"/>
-            <a:endParaRPr lang="en-US" sz="1100">
+            <a:endParaRPr lang="en-US">
               <a:latin typeface="NimbusRomNo9L" panose="01010103010101010101" pitchFamily="2" charset="0"/>
             </a:endParaRPr>
           </a:p>
@@ -3215,13 +3215,13 @@
       </p:sp>
       <p:sp>
         <p:nvSpPr>
-          <p:cNvPr id="33" name="Rectangle 32"/>
+          <p:cNvPr id="93" name="Rectangle 92"/>
           <p:cNvSpPr/>
           <p:nvPr/>
         </p:nvSpPr>
         <p:spPr>
           <a:xfrm>
-            <a:off x="4585866" y="1457411"/>
+            <a:off x="5576466" y="1457411"/>
             <a:ext cx="824334" cy="549556"/>
           </a:xfrm>
           <a:prstGeom prst="rect">
@@ -3258,7 +3258,7 @@
           <a:p>
             <a:pPr algn="ctr"/>
             <a:r>
-              <a:rPr lang="en-US" sz="1100" b="1" dirty="0" smtClean="0">
+              <a:rPr lang="en-US" b="1" dirty="0" smtClean="0">
                 <a:solidFill>
                   <a:schemeClr val="tx1"/>
                 </a:solidFill>
@@ -3267,7 +3267,7 @@
               </a:rPr>
               <a:t>Ultrasound System</a:t>
             </a:r>
-            <a:endParaRPr lang="en-US" sz="1100" b="1" dirty="0">
+            <a:endParaRPr lang="en-US" b="1" dirty="0">
               <a:solidFill>
                 <a:schemeClr val="tx1"/>
               </a:solidFill>
@@ -3279,13 +3279,13 @@
       </p:sp>
       <p:sp>
         <p:nvSpPr>
-          <p:cNvPr id="34" name="Rectangle 33"/>
+          <p:cNvPr id="95" name="Rectangle 94"/>
           <p:cNvSpPr/>
           <p:nvPr/>
         </p:nvSpPr>
         <p:spPr>
           <a:xfrm>
-            <a:off x="2946358" y="1457411"/>
+            <a:off x="318666" y="248388"/>
             <a:ext cx="824334" cy="549556"/>
           </a:xfrm>
           <a:prstGeom prst="rect">
@@ -3322,37 +3322,44 @@
           <a:p>
             <a:pPr algn="ctr"/>
             <a:r>
-              <a:rPr lang="en-US" sz="1100" b="1" dirty="0" smtClean="0">
+              <a:rPr lang="en-US" b="1" dirty="0" smtClean="0">
                 <a:solidFill>
                   <a:schemeClr val="tx1"/>
                 </a:solidFill>
                 <a:latin typeface="NimbusRomNo9L" panose="01010103010101010101" pitchFamily="2" charset="0"/>
                 <a:cs typeface="Times New Roman" pitchFamily="18" charset="0"/>
               </a:rPr>
-              <a:t>2-D Image </a:t>
-            </a:r>
-            <a:r>
-              <a:rPr lang="en-US" sz="1100" b="1" dirty="0">
+              <a:t>Steering </a:t>
+            </a:r>
+            <a:r>
+              <a:rPr lang="en-US" b="1" dirty="0" smtClean="0">
                 <a:solidFill>
                   <a:schemeClr val="tx1"/>
                 </a:solidFill>
                 <a:latin typeface="NimbusRomNo9L" panose="01010103010101010101" pitchFamily="2" charset="0"/>
                 <a:cs typeface="Times New Roman" pitchFamily="18" charset="0"/>
               </a:rPr>
-              <a:t>Processing</a:t>
-            </a:r>
-          </a:p>
-        </p:txBody>
-      </p:sp>
-      <p:sp>
-        <p:nvSpPr>
-          <p:cNvPr id="35" name="Rectangle 34"/>
+              <a:t>Controller</a:t>
+            </a:r>
+            <a:endParaRPr lang="en-US" b="1" dirty="0">
+              <a:solidFill>
+                <a:schemeClr val="tx1"/>
+              </a:solidFill>
+              <a:latin typeface="NimbusRomNo9L" panose="01010103010101010101" pitchFamily="2" charset="0"/>
+              <a:cs typeface="Times New Roman" pitchFamily="18" charset="0"/>
+            </a:endParaRPr>
+          </a:p>
+        </p:txBody>
+      </p:sp>
+      <p:sp>
+        <p:nvSpPr>
+          <p:cNvPr id="96" name="Rectangle 95"/>
           <p:cNvSpPr/>
           <p:nvPr/>
         </p:nvSpPr>
         <p:spPr>
           <a:xfrm>
-            <a:off x="323278" y="248388"/>
+            <a:off x="5271666" y="248388"/>
             <a:ext cx="824334" cy="549556"/>
           </a:xfrm>
           <a:prstGeom prst="rect">
@@ -3389,71 +3396,7 @@
           <a:p>
             <a:pPr algn="ctr"/>
             <a:r>
-              <a:rPr lang="en-US" sz="1100" b="1" dirty="0" smtClean="0">
-                <a:solidFill>
-                  <a:schemeClr val="tx1"/>
-                </a:solidFill>
-                <a:latin typeface="NimbusRomNo9L" panose="01010103010101010101" pitchFamily="2" charset="0"/>
-                <a:cs typeface="Times New Roman" pitchFamily="18" charset="0"/>
-              </a:rPr>
-              <a:t>Steering Planner</a:t>
-            </a:r>
-            <a:endParaRPr lang="en-US" sz="1100" b="1" dirty="0">
-              <a:solidFill>
-                <a:schemeClr val="tx1"/>
-              </a:solidFill>
-              <a:latin typeface="NimbusRomNo9L" panose="01010103010101010101" pitchFamily="2" charset="0"/>
-              <a:cs typeface="Times New Roman" pitchFamily="18" charset="0"/>
-            </a:endParaRPr>
-          </a:p>
-        </p:txBody>
-      </p:sp>
-      <p:sp>
-        <p:nvSpPr>
-          <p:cNvPr id="36" name="Rectangle 35"/>
-          <p:cNvSpPr/>
-          <p:nvPr/>
-        </p:nvSpPr>
-        <p:spPr>
-          <a:xfrm>
-            <a:off x="4580994" y="248388"/>
-            <a:ext cx="824334" cy="549556"/>
-          </a:xfrm>
-          <a:prstGeom prst="rect">
-            <a:avLst/>
-          </a:prstGeom>
-          <a:solidFill>
-            <a:schemeClr val="bg1"/>
-          </a:solidFill>
-          <a:ln w="28575">
-            <a:solidFill>
-              <a:schemeClr val="tx1"/>
-            </a:solidFill>
-          </a:ln>
-        </p:spPr>
-        <p:style>
-          <a:lnRef idx="2">
-            <a:schemeClr val="accent1">
-              <a:shade val="50000"/>
-            </a:schemeClr>
-          </a:lnRef>
-          <a:fillRef idx="1">
-            <a:schemeClr val="accent1"/>
-          </a:fillRef>
-          <a:effectRef idx="0">
-            <a:schemeClr val="accent1"/>
-          </a:effectRef>
-          <a:fontRef idx="minor">
-            <a:schemeClr val="lt1"/>
-          </a:fontRef>
-        </p:style>
-        <p:txBody>
-          <a:bodyPr rtlCol="0" anchor="ctr"/>
-          <a:lstStyle/>
-          <a:p>
-            <a:pPr algn="ctr"/>
-            <a:r>
-              <a:rPr lang="en-US" sz="1100" b="1" dirty="0">
+              <a:rPr lang="en-US" b="1" dirty="0">
                 <a:solidFill>
                   <a:schemeClr val="tx1"/>
                 </a:solidFill>
@@ -3467,15 +3410,15 @@
       </p:sp>
       <p:cxnSp>
         <p:nvCxnSpPr>
-          <p:cNvPr id="37" name="Straight Arrow Connector 36"/>
+          <p:cNvPr id="97" name="Straight Arrow Connector 96"/>
           <p:cNvCxnSpPr>
-            <a:endCxn id="35" idx="1"/>
+            <a:endCxn id="95" idx="1"/>
           </p:cNvCxnSpPr>
           <p:nvPr/>
         </p:nvCxnSpPr>
         <p:spPr>
           <a:xfrm>
-            <a:off x="0" y="523166"/>
+            <a:off x="-4612" y="523166"/>
             <a:ext cx="323278" cy="0"/>
           </a:xfrm>
           <a:prstGeom prst="straightConnector1">
@@ -3509,17 +3452,17 @@
           </a:fontRef>
         </p:style>
       </p:cxnSp>
-      <mc:AlternateContent xmlns:mc="http://schemas.openxmlformats.org/markup-compatibility/2006" xmlns:a14="http://schemas.microsoft.com/office/drawing/2010/main">
-        <mc:Choice Requires="a14">
+      <mc:AlternateContent xmlns:mc="http://schemas.openxmlformats.org/markup-compatibility/2006">
+        <mc:Choice xmlns:a14="http://schemas.microsoft.com/office/drawing/2010/main" Requires="a14">
           <p:sp>
             <p:nvSpPr>
-              <p:cNvPr id="38" name="Rectangle 37"/>
+              <p:cNvPr id="98" name="Rectangle 97"/>
               <p:cNvSpPr/>
               <p:nvPr/>
             </p:nvSpPr>
             <p:spPr>
               <a:xfrm>
-                <a:off x="-152400" y="254689"/>
+                <a:off x="-168556" y="243993"/>
                 <a:ext cx="549556" cy="274778"/>
               </a:xfrm>
               <a:prstGeom prst="rect">
@@ -3558,19 +3501,19 @@
                     </m:oMathParaPr>
                     <m:oMath xmlns:m="http://schemas.openxmlformats.org/officeDocument/2006/math">
                       <m:r>
-                        <a:rPr lang="en-US" sz="1100" b="1" i="1" smtClean="0">
+                        <a:rPr lang="en-US" b="0" i="1" smtClean="0">
                           <a:solidFill>
                             <a:schemeClr val="tx1"/>
                           </a:solidFill>
                           <a:latin typeface="Cambria Math"/>
                           <a:cs typeface="Times New Roman" pitchFamily="18" charset="0"/>
                         </a:rPr>
-                        <m:t>𝒕</m:t>
+                        <m:t>𝑡</m:t>
                       </m:r>
                     </m:oMath>
                   </m:oMathPara>
                 </a14:m>
-                <a:endParaRPr lang="en-US" sz="1100" b="1" i="1" dirty="0">
+                <a:endParaRPr lang="en-US" i="1" dirty="0">
                   <a:solidFill>
                     <a:schemeClr val="tx1"/>
                   </a:solidFill>
@@ -3581,10 +3524,10 @@
             </p:txBody>
           </p:sp>
         </mc:Choice>
-        <mc:Fallback xmlns="">
+        <mc:Fallback>
           <p:sp>
             <p:nvSpPr>
-              <p:cNvPr id="38" name="Rectangle 37"/>
+              <p:cNvPr id="98" name="Rectangle 97"/>
               <p:cNvSpPr>
                 <a:spLocks noRot="1" noChangeAspect="1" noMove="1" noResize="1" noEditPoints="1" noAdjustHandles="1" noChangeArrowheads="1" noChangeShapeType="1" noTextEdit="1"/>
               </p:cNvSpPr>
@@ -3592,13 +3535,13 @@
             </p:nvSpPr>
             <p:spPr>
               <a:xfrm>
-                <a:off x="-152400" y="254689"/>
+                <a:off x="-168556" y="243993"/>
                 <a:ext cx="549556" cy="274778"/>
               </a:xfrm>
               <a:prstGeom prst="rect">
                 <a:avLst/>
               </a:prstGeom>
-              <a:blipFill rotWithShape="1">
+              <a:blipFill rotWithShape="0">
                 <a:blip r:embed="rId2"/>
                 <a:stretch>
                   <a:fillRect/>
@@ -3625,17 +3568,17 @@
       </mc:AlternateContent>
       <p:cxnSp>
         <p:nvCxnSpPr>
-          <p:cNvPr id="39" name="Straight Arrow Connector 38"/>
+          <p:cNvPr id="99" name="Straight Arrow Connector 98"/>
           <p:cNvCxnSpPr>
-            <a:stCxn id="35" idx="3"/>
-            <a:endCxn id="54" idx="1"/>
+            <a:stCxn id="95" idx="3"/>
+            <a:endCxn id="114" idx="1"/>
           </p:cNvCxnSpPr>
           <p:nvPr/>
         </p:nvCxnSpPr>
         <p:spPr>
           <a:xfrm>
-            <a:off x="1147612" y="523166"/>
-            <a:ext cx="547670" cy="0"/>
+            <a:off x="1143000" y="523166"/>
+            <a:ext cx="876300" cy="0"/>
           </a:xfrm>
           <a:prstGeom prst="straightConnector1">
             <a:avLst/>
@@ -3668,17 +3611,17 @@
           </a:fontRef>
         </p:style>
       </p:cxnSp>
-      <mc:AlternateContent xmlns:mc="http://schemas.openxmlformats.org/markup-compatibility/2006" xmlns:a14="http://schemas.microsoft.com/office/drawing/2010/main">
-        <mc:Choice Requires="a14">
+      <mc:AlternateContent xmlns:mc="http://schemas.openxmlformats.org/markup-compatibility/2006">
+        <mc:Choice xmlns:a14="http://schemas.microsoft.com/office/drawing/2010/main" Requires="a14">
           <p:sp>
             <p:nvSpPr>
-              <p:cNvPr id="40" name="Rectangle 39"/>
+              <p:cNvPr id="100" name="Rectangle 99"/>
               <p:cNvSpPr/>
               <p:nvPr/>
             </p:nvSpPr>
             <p:spPr>
               <a:xfrm>
-                <a:off x="1147612" y="248388"/>
+                <a:off x="1300012" y="228600"/>
                 <a:ext cx="452588" cy="274778"/>
               </a:xfrm>
               <a:prstGeom prst="rect">
@@ -3717,7 +3660,7 @@
                     </m:oMathParaPr>
                     <m:oMath xmlns:m="http://schemas.openxmlformats.org/officeDocument/2006/math">
                       <m:r>
-                        <a:rPr lang="en-US" sz="1100" b="0" i="1" smtClean="0">
+                        <a:rPr lang="en-US" b="0" i="1" smtClean="0">
                           <a:solidFill>
                             <a:schemeClr val="tx1"/>
                           </a:solidFill>
@@ -3728,7 +3671,7 @@
                         <m:t>𝛿𝜃</m:t>
                       </m:r>
                       <m:r>
-                        <a:rPr lang="en-US" sz="1100" b="0" i="1" smtClean="0">
+                        <a:rPr lang="en-US" b="0" i="1" smtClean="0">
                           <a:solidFill>
                             <a:schemeClr val="tx1"/>
                           </a:solidFill>
@@ -3738,21 +3681,53 @@
                         </a:rPr>
                         <m:t>, </m:t>
                       </m:r>
-                      <m:r>
-                        <a:rPr lang="en-US" sz="1100" b="0" i="1" smtClean="0">
-                          <a:solidFill>
-                            <a:schemeClr val="tx1"/>
-                          </a:solidFill>
-                          <a:latin typeface="Cambria Math"/>
-                          <a:ea typeface="Cambria Math"/>
-                          <a:cs typeface="Times New Roman" pitchFamily="18" charset="0"/>
-                        </a:rPr>
-                        <m:t>𝜌</m:t>
-                      </m:r>
+                      <m:sSub>
+                        <m:sSubPr>
+                          <m:ctrlPr>
+                            <a:rPr lang="en-US" b="0" i="1" smtClean="0">
+                              <a:solidFill>
+                                <a:schemeClr val="tx1"/>
+                              </a:solidFill>
+                              <a:latin typeface="Cambria Math" panose="02040503050406030204" pitchFamily="18" charset="0"/>
+                              <a:ea typeface="Cambria Math"/>
+                              <a:cs typeface="Times New Roman" pitchFamily="18" charset="0"/>
+                            </a:rPr>
+                          </m:ctrlPr>
+                        </m:sSubPr>
+                        <m:e>
+                          <m:r>
+                            <a:rPr lang="en-US" i="1">
+                              <a:solidFill>
+                                <a:schemeClr val="tx1"/>
+                              </a:solidFill>
+                              <a:latin typeface="Cambria Math"/>
+                              <a:ea typeface="Cambria Math"/>
+                              <a:cs typeface="Times New Roman" pitchFamily="18" charset="0"/>
+                            </a:rPr>
+                            <m:t>𝜌</m:t>
+                          </m:r>
+                        </m:e>
+                        <m:sub>
+                          <m:r>
+                            <m:rPr>
+                              <m:sty m:val="p"/>
+                            </m:rPr>
+                            <a:rPr lang="en-US" b="0" i="0" smtClean="0">
+                              <a:solidFill>
+                                <a:schemeClr val="tx1"/>
+                              </a:solidFill>
+                              <a:latin typeface="Cambria Math" panose="02040503050406030204" pitchFamily="18" charset="0"/>
+                              <a:ea typeface="Cambria Math"/>
+                              <a:cs typeface="Times New Roman" pitchFamily="18" charset="0"/>
+                            </a:rPr>
+                            <m:t>des</m:t>
+                          </m:r>
+                        </m:sub>
+                      </m:sSub>
                     </m:oMath>
                   </m:oMathPara>
                 </a14:m>
-                <a:endParaRPr lang="en-US" sz="1100" i="1" dirty="0">
+                <a:endParaRPr lang="en-US" i="1" dirty="0">
                   <a:solidFill>
                     <a:schemeClr val="tx1"/>
                   </a:solidFill>
@@ -3763,10 +3738,10 @@
             </p:txBody>
           </p:sp>
         </mc:Choice>
-        <mc:Fallback xmlns="">
+        <mc:Fallback>
           <p:sp>
             <p:nvSpPr>
-              <p:cNvPr id="40" name="Rectangle 39"/>
+              <p:cNvPr id="100" name="Rectangle 99"/>
               <p:cNvSpPr>
                 <a:spLocks noRot="1" noChangeAspect="1" noMove="1" noResize="1" noEditPoints="1" noAdjustHandles="1" noChangeArrowheads="1" noChangeShapeType="1" noTextEdit="1"/>
               </p:cNvSpPr>
@@ -3774,16 +3749,16 @@
             </p:nvSpPr>
             <p:spPr>
               <a:xfrm>
-                <a:off x="1147612" y="248388"/>
+                <a:off x="1300012" y="228600"/>
                 <a:ext cx="452588" cy="274778"/>
               </a:xfrm>
               <a:prstGeom prst="rect">
                 <a:avLst/>
               </a:prstGeom>
-              <a:blipFill rotWithShape="1">
+              <a:blipFill rotWithShape="0">
                 <a:blip r:embed="rId3"/>
                 <a:stretch>
-                  <a:fillRect/>
+                  <a:fillRect l="-10667"/>
                 </a:stretch>
               </a:blipFill>
               <a:ln w="28575">
@@ -3807,17 +3782,17 @@
       </mc:AlternateContent>
       <p:cxnSp>
         <p:nvCxnSpPr>
-          <p:cNvPr id="41" name="Straight Arrow Connector 40"/>
+          <p:cNvPr id="101" name="Straight Arrow Connector 100"/>
           <p:cNvCxnSpPr>
-            <a:stCxn id="33" idx="1"/>
-            <a:endCxn id="34" idx="3"/>
+            <a:stCxn id="93" idx="1"/>
+            <a:endCxn id="94" idx="3"/>
           </p:cNvCxnSpPr>
           <p:nvPr/>
         </p:nvCxnSpPr>
         <p:spPr>
           <a:xfrm flipH="1">
-            <a:off x="3770692" y="1732189"/>
-            <a:ext cx="815174" cy="0"/>
+            <a:off x="4832706" y="1732189"/>
+            <a:ext cx="743760" cy="0"/>
           </a:xfrm>
           <a:prstGeom prst="straightConnector1">
             <a:avLst/>
@@ -3850,18 +3825,18 @@
           </a:fontRef>
         </p:style>
       </p:cxnSp>
-      <mc:AlternateContent xmlns:mc="http://schemas.openxmlformats.org/markup-compatibility/2006" xmlns:a14="http://schemas.microsoft.com/office/drawing/2010/main">
-        <mc:Choice Requires="a14">
+      <mc:AlternateContent xmlns:mc="http://schemas.openxmlformats.org/markup-compatibility/2006">
+        <mc:Choice xmlns:a14="http://schemas.microsoft.com/office/drawing/2010/main" Requires="a14">
           <p:sp>
             <p:nvSpPr>
-              <p:cNvPr id="42" name="Rectangle 41"/>
+              <p:cNvPr id="102" name="Rectangle 101"/>
               <p:cNvSpPr/>
               <p:nvPr/>
             </p:nvSpPr>
             <p:spPr>
               <a:xfrm>
-                <a:off x="3810000" y="1457411"/>
-                <a:ext cx="824334" cy="274778"/>
+                <a:off x="4911674" y="1469644"/>
+                <a:ext cx="727126" cy="274778"/>
               </a:xfrm>
               <a:prstGeom prst="rect">
                 <a:avLst/>
@@ -3895,7 +3870,7 @@
                 <a14:m>
                   <m:oMath xmlns:m="http://schemas.openxmlformats.org/officeDocument/2006/math">
                     <m:r>
-                      <a:rPr lang="en-US" sz="1100" b="0" i="1" smtClean="0">
+                      <a:rPr lang="en-US" b="0" i="1" smtClean="0">
                         <a:solidFill>
                           <a:schemeClr val="tx1"/>
                         </a:solidFill>
@@ -3905,7 +3880,7 @@
                       <m:t>𝑁</m:t>
                     </m:r>
                     <m:r>
-                      <a:rPr lang="en-US" sz="1100" b="0" i="1" smtClean="0">
+                      <a:rPr lang="en-US" b="0" i="1" smtClean="0">
                         <a:solidFill>
                           <a:schemeClr val="tx1"/>
                         </a:solidFill>
@@ -3917,7 +3892,7 @@
                   </m:oMath>
                 </a14:m>
                 <a:r>
-                  <a:rPr lang="en-US" sz="1100" b="1" i="1" dirty="0" smtClean="0">
+                  <a:rPr lang="en-US" b="1" i="1" dirty="0" smtClean="0">
                     <a:solidFill>
                       <a:schemeClr val="tx1"/>
                     </a:solidFill>
@@ -3927,7 +3902,7 @@
                   <a:t> </a:t>
                 </a:r>
                 <a:r>
-                  <a:rPr lang="en-US" sz="1100" dirty="0" smtClean="0">
+                  <a:rPr lang="en-US" dirty="0" smtClean="0">
                     <a:solidFill>
                       <a:schemeClr val="tx1"/>
                     </a:solidFill>
@@ -3936,7 +3911,7 @@
                   </a:rPr>
                   <a:t>images</a:t>
                 </a:r>
-                <a:endParaRPr lang="en-US" sz="1100" dirty="0">
+                <a:endParaRPr lang="en-US" dirty="0">
                   <a:solidFill>
                     <a:schemeClr val="tx1"/>
                   </a:solidFill>
@@ -3947,10 +3922,10 @@
             </p:txBody>
           </p:sp>
         </mc:Choice>
-        <mc:Fallback xmlns="">
+        <mc:Fallback>
           <p:sp>
             <p:nvSpPr>
-              <p:cNvPr id="42" name="Rectangle 41"/>
+              <p:cNvPr id="102" name="Rectangle 101"/>
               <p:cNvSpPr>
                 <a:spLocks noRot="1" noChangeAspect="1" noMove="1" noResize="1" noEditPoints="1" noAdjustHandles="1" noChangeArrowheads="1" noChangeShapeType="1" noTextEdit="1"/>
               </p:cNvSpPr>
@@ -3958,16 +3933,16 @@
             </p:nvSpPr>
             <p:spPr>
               <a:xfrm>
-                <a:off x="3810000" y="1457411"/>
-                <a:ext cx="824334" cy="274778"/>
+                <a:off x="4911674" y="1469644"/>
+                <a:ext cx="727126" cy="274778"/>
               </a:xfrm>
               <a:prstGeom prst="rect">
                 <a:avLst/>
               </a:prstGeom>
-              <a:blipFill rotWithShape="1">
+              <a:blipFill rotWithShape="0">
                 <a:blip r:embed="rId4"/>
                 <a:stretch>
-                  <a:fillRect b="-11111"/>
+                  <a:fillRect b="-6667"/>
                 </a:stretch>
               </a:blipFill>
               <a:ln w="28575">
@@ -3991,16 +3966,16 @@
       </mc:AlternateContent>
       <p:cxnSp>
         <p:nvCxnSpPr>
-          <p:cNvPr id="43" name="Straight Arrow Connector 42"/>
+          <p:cNvPr id="103" name="Straight Arrow Connector 102"/>
           <p:cNvCxnSpPr>
-            <a:stCxn id="36" idx="3"/>
+            <a:stCxn id="96" idx="3"/>
           </p:cNvCxnSpPr>
           <p:nvPr/>
         </p:nvCxnSpPr>
         <p:spPr>
-          <a:xfrm flipV="1">
-            <a:off x="5405328" y="523165"/>
-            <a:ext cx="538272" cy="1"/>
+          <a:xfrm>
+            <a:off x="6096000" y="523166"/>
+            <a:ext cx="762000" cy="0"/>
           </a:xfrm>
           <a:prstGeom prst="straightConnector1">
             <a:avLst/>
@@ -4035,13 +4010,13 @@
       </p:cxnSp>
       <p:sp>
         <p:nvSpPr>
-          <p:cNvPr id="44" name="Rectangle 43"/>
+          <p:cNvPr id="104" name="Rectangle 103"/>
           <p:cNvSpPr/>
           <p:nvPr/>
         </p:nvSpPr>
         <p:spPr>
           <a:xfrm>
-            <a:off x="5421485" y="115971"/>
+            <a:off x="6172200" y="152400"/>
             <a:ext cx="522115" cy="366371"/>
           </a:xfrm>
           <a:prstGeom prst="rect">
@@ -4074,7 +4049,7 @@
           <a:p>
             <a:pPr algn="ctr"/>
             <a:r>
-              <a:rPr lang="en-US" sz="1100" dirty="0">
+              <a:rPr lang="en-US" dirty="0">
                 <a:solidFill>
                   <a:schemeClr val="tx1"/>
                 </a:solidFill>
@@ -4087,7 +4062,7 @@
           <a:p>
             <a:pPr algn="ctr"/>
             <a:r>
-              <a:rPr lang="en-US" sz="1100" dirty="0" err="1">
+              <a:rPr lang="en-US" dirty="0" err="1">
                 <a:solidFill>
                   <a:schemeClr val="tx1"/>
                 </a:solidFill>
@@ -4097,7 +4072,7 @@
               <a:t>config</a:t>
             </a:r>
             <a:r>
-              <a:rPr lang="en-US" sz="1100" dirty="0">
+              <a:rPr lang="en-US" dirty="0">
                 <a:solidFill>
                   <a:schemeClr val="tx1"/>
                 </a:solidFill>
@@ -4111,16 +4086,16 @@
       </p:sp>
       <p:cxnSp>
         <p:nvCxnSpPr>
-          <p:cNvPr id="45" name="Elbow Connector 44"/>
+          <p:cNvPr id="105" name="Elbow Connector 104"/>
           <p:cNvCxnSpPr>
-            <a:endCxn id="33" idx="3"/>
+            <a:endCxn id="93" idx="3"/>
           </p:cNvCxnSpPr>
           <p:nvPr/>
         </p:nvCxnSpPr>
         <p:spPr>
           <a:xfrm rot="5400000">
-            <a:off x="4945529" y="995173"/>
-            <a:ext cx="1201687" cy="272344"/>
+            <a:off x="5910589" y="1013377"/>
+            <a:ext cx="1209023" cy="228600"/>
           </a:xfrm>
           <a:prstGeom prst="bentConnector2">
             <a:avLst/>
@@ -4153,17 +4128,797 @@
           </a:fontRef>
         </p:style>
       </p:cxnSp>
-      <mc:AlternateContent xmlns:mc="http://schemas.openxmlformats.org/markup-compatibility/2006" xmlns:a14="http://schemas.microsoft.com/office/drawing/2010/main">
-        <mc:Choice Requires="a14">
+      <p:sp>
+        <p:nvSpPr>
+          <p:cNvPr id="110" name="Rectangle 109"/>
+          <p:cNvSpPr/>
+          <p:nvPr/>
+        </p:nvSpPr>
+        <p:spPr>
+          <a:xfrm>
+            <a:off x="2240028" y="2097949"/>
+            <a:ext cx="2712972" cy="188051"/>
+          </a:xfrm>
+          <a:prstGeom prst="rect">
+            <a:avLst/>
+          </a:prstGeom>
+          <a:noFill/>
+          <a:ln w="28575">
+            <a:noFill/>
+          </a:ln>
+        </p:spPr>
+        <p:style>
+          <a:lnRef idx="2">
+            <a:schemeClr val="accent1">
+              <a:shade val="50000"/>
+            </a:schemeClr>
+          </a:lnRef>
+          <a:fillRef idx="1">
+            <a:schemeClr val="accent1"/>
+          </a:fillRef>
+          <a:effectRef idx="0">
+            <a:schemeClr val="accent1"/>
+          </a:effectRef>
+          <a:fontRef idx="minor">
+            <a:schemeClr val="lt1"/>
+          </a:fontRef>
+        </p:style>
+        <p:txBody>
+          <a:bodyPr rtlCol="0" anchor="ctr"/>
+          <a:lstStyle/>
+          <a:p>
+            <a:pPr algn="ctr"/>
+            <a:r>
+              <a:rPr lang="en-US" b="1" dirty="0" smtClean="0">
+                <a:solidFill>
+                  <a:schemeClr val="tx1"/>
+                </a:solidFill>
+                <a:latin typeface="NimbusRomNo9L" panose="01010103010101010101" pitchFamily="2" charset="0"/>
+                <a:cs typeface="Times New Roman" pitchFamily="18" charset="0"/>
+              </a:rPr>
+              <a:t>Needle Segmentation</a:t>
+            </a:r>
+            <a:endParaRPr lang="en-US" b="1" dirty="0">
+              <a:solidFill>
+                <a:schemeClr val="tx1"/>
+              </a:solidFill>
+              <a:latin typeface="NimbusRomNo9L" panose="01010103010101010101" pitchFamily="2" charset="0"/>
+              <a:cs typeface="Times New Roman" pitchFamily="18" charset="0"/>
+            </a:endParaRPr>
+          </a:p>
+        </p:txBody>
+      </p:sp>
+      <p:sp>
+        <p:nvSpPr>
+          <p:cNvPr id="112" name="Rectangle 111"/>
+          <p:cNvSpPr/>
+          <p:nvPr/>
+        </p:nvSpPr>
+        <p:spPr>
+          <a:xfrm>
+            <a:off x="3557166" y="248388"/>
+            <a:ext cx="824334" cy="549556"/>
+          </a:xfrm>
+          <a:prstGeom prst="rect">
+            <a:avLst/>
+          </a:prstGeom>
+          <a:solidFill>
+            <a:schemeClr val="bg1"/>
+          </a:solidFill>
+          <a:ln w="28575">
+            <a:solidFill>
+              <a:schemeClr val="tx1"/>
+            </a:solidFill>
+          </a:ln>
+        </p:spPr>
+        <p:style>
+          <a:lnRef idx="2">
+            <a:schemeClr val="accent1">
+              <a:shade val="50000"/>
+            </a:schemeClr>
+          </a:lnRef>
+          <a:fillRef idx="1">
+            <a:schemeClr val="accent1"/>
+          </a:fillRef>
+          <a:effectRef idx="0">
+            <a:schemeClr val="accent1"/>
+          </a:effectRef>
+          <a:fontRef idx="minor">
+            <a:schemeClr val="lt1"/>
+          </a:fontRef>
+        </p:style>
+        <p:txBody>
+          <a:bodyPr rtlCol="0" anchor="ctr"/>
+          <a:lstStyle/>
+          <a:p>
+            <a:pPr algn="ctr"/>
+            <a:r>
+              <a:rPr lang="en-US" b="1" dirty="0" smtClean="0">
+                <a:solidFill>
+                  <a:schemeClr val="tx1"/>
+                </a:solidFill>
+                <a:latin typeface="NimbusRomNo9L" panose="01010103010101010101" pitchFamily="2" charset="0"/>
+                <a:cs typeface="Times New Roman" pitchFamily="18" charset="0"/>
+              </a:rPr>
+              <a:t>Motor</a:t>
+            </a:r>
+          </a:p>
+          <a:p>
+            <a:pPr algn="ctr"/>
+            <a:r>
+              <a:rPr lang="en-US" b="1" dirty="0" smtClean="0">
+                <a:solidFill>
+                  <a:schemeClr val="tx1"/>
+                </a:solidFill>
+                <a:latin typeface="NimbusRomNo9L" panose="01010103010101010101" pitchFamily="2" charset="0"/>
+                <a:cs typeface="Times New Roman" pitchFamily="18" charset="0"/>
+              </a:rPr>
+              <a:t>Controllers</a:t>
+            </a:r>
+            <a:endParaRPr lang="en-US" b="1" dirty="0">
+              <a:solidFill>
+                <a:schemeClr val="tx1"/>
+              </a:solidFill>
+              <a:latin typeface="NimbusRomNo9L" panose="01010103010101010101" pitchFamily="2" charset="0"/>
+              <a:cs typeface="Times New Roman" pitchFamily="18" charset="0"/>
+            </a:endParaRPr>
+          </a:p>
+        </p:txBody>
+      </p:sp>
+      <mc:AlternateContent xmlns:mc="http://schemas.openxmlformats.org/markup-compatibility/2006">
+        <mc:Choice xmlns:a14="http://schemas.microsoft.com/office/drawing/2010/main" Requires="a14">
           <p:sp>
             <p:nvSpPr>
-              <p:cNvPr id="46" name="Rectangle 45"/>
+              <p:cNvPr id="113" name="Rectangle 112"/>
               <p:cNvSpPr/>
               <p:nvPr/>
             </p:nvSpPr>
             <p:spPr>
               <a:xfrm>
-                <a:off x="2057400" y="1457411"/>
+                <a:off x="2918726" y="241050"/>
+                <a:ext cx="585704" cy="274778"/>
+              </a:xfrm>
+              <a:prstGeom prst="rect">
+                <a:avLst/>
+              </a:prstGeom>
+              <a:noFill/>
+              <a:ln w="28575">
+                <a:noFill/>
+              </a:ln>
+            </p:spPr>
+            <p:style>
+              <a:lnRef idx="2">
+                <a:schemeClr val="accent1">
+                  <a:shade val="50000"/>
+                </a:schemeClr>
+              </a:lnRef>
+              <a:fillRef idx="1">
+                <a:schemeClr val="accent1"/>
+              </a:fillRef>
+              <a:effectRef idx="0">
+                <a:schemeClr val="accent1"/>
+              </a:effectRef>
+              <a:fontRef idx="minor">
+                <a:schemeClr val="lt1"/>
+              </a:fontRef>
+            </p:style>
+            <p:txBody>
+              <a:bodyPr rtlCol="0" anchor="ctr"/>
+              <a:lstStyle/>
+              <a:p>
+                <a:pPr algn="ctr"/>
+                <a14:m>
+                  <m:oMathPara xmlns:m="http://schemas.openxmlformats.org/officeDocument/2006/math">
+                    <m:oMathParaPr>
+                      <m:jc m:val="center"/>
+                    </m:oMathParaPr>
+                    <m:oMath xmlns:m="http://schemas.openxmlformats.org/officeDocument/2006/math">
+                      <m:sSub>
+                        <m:sSubPr>
+                          <m:ctrlPr>
+                            <a:rPr lang="en-US" i="1" smtClean="0">
+                              <a:solidFill>
+                                <a:schemeClr val="tx1"/>
+                              </a:solidFill>
+                              <a:latin typeface="Cambria Math" panose="02040503050406030204" pitchFamily="18" charset="0"/>
+                              <a:ea typeface="Cambria Math"/>
+                              <a:cs typeface="Times New Roman" pitchFamily="18" charset="0"/>
+                            </a:rPr>
+                          </m:ctrlPr>
+                        </m:sSubPr>
+                        <m:e>
+                          <m:acc>
+                            <m:accPr>
+                              <m:chr m:val="̇"/>
+                              <m:ctrlPr>
+                                <a:rPr lang="en-US" i="1" smtClean="0">
+                                  <a:solidFill>
+                                    <a:schemeClr val="tx1"/>
+                                  </a:solidFill>
+                                  <a:latin typeface="Cambria Math" panose="02040503050406030204" pitchFamily="18" charset="0"/>
+                                  <a:ea typeface="Cambria Math"/>
+                                  <a:cs typeface="Times New Roman" pitchFamily="18" charset="0"/>
+                                </a:rPr>
+                              </m:ctrlPr>
+                            </m:accPr>
+                            <m:e>
+                              <m:r>
+                                <a:rPr lang="en-US" b="0" i="1" smtClean="0">
+                                  <a:solidFill>
+                                    <a:schemeClr val="tx1"/>
+                                  </a:solidFill>
+                                  <a:latin typeface="Cambria Math"/>
+                                  <a:ea typeface="Cambria Math"/>
+                                  <a:cs typeface="Times New Roman" pitchFamily="18" charset="0"/>
+                                </a:rPr>
+                                <m:t>𝑘</m:t>
+                              </m:r>
+                            </m:e>
+                          </m:acc>
+                        </m:e>
+                        <m:sub>
+                          <m:r>
+                            <m:rPr>
+                              <m:sty m:val="p"/>
+                            </m:rPr>
+                            <a:rPr lang="en-US" b="0" i="0" smtClean="0">
+                              <a:solidFill>
+                                <a:schemeClr val="tx1"/>
+                              </a:solidFill>
+                              <a:latin typeface="Cambria Math"/>
+                              <a:ea typeface="Cambria Math"/>
+                              <a:cs typeface="Times New Roman" pitchFamily="18" charset="0"/>
+                            </a:rPr>
+                            <m:t>rot</m:t>
+                          </m:r>
+                        </m:sub>
+                      </m:sSub>
+                      <m:r>
+                        <a:rPr lang="en-US" b="0" i="1" smtClean="0">
+                          <a:solidFill>
+                            <a:schemeClr val="tx1"/>
+                          </a:solidFill>
+                          <a:latin typeface="Cambria Math"/>
+                          <a:ea typeface="Cambria Math"/>
+                          <a:cs typeface="Times New Roman" pitchFamily="18" charset="0"/>
+                        </a:rPr>
+                        <m:t>, </m:t>
+                      </m:r>
+                      <m:sSub>
+                        <m:sSubPr>
+                          <m:ctrlPr>
+                            <a:rPr lang="en-US" i="1" smtClean="0">
+                              <a:solidFill>
+                                <a:schemeClr val="tx1"/>
+                              </a:solidFill>
+                              <a:latin typeface="Cambria Math" panose="02040503050406030204" pitchFamily="18" charset="0"/>
+                              <a:ea typeface="Cambria Math"/>
+                              <a:cs typeface="Times New Roman" pitchFamily="18" charset="0"/>
+                            </a:rPr>
+                          </m:ctrlPr>
+                        </m:sSubPr>
+                        <m:e>
+                          <m:acc>
+                            <m:accPr>
+                              <m:chr m:val="̇"/>
+                              <m:ctrlPr>
+                                <a:rPr lang="en-US" i="1" smtClean="0">
+                                  <a:solidFill>
+                                    <a:schemeClr val="tx1"/>
+                                  </a:solidFill>
+                                  <a:latin typeface="Cambria Math" panose="02040503050406030204" pitchFamily="18" charset="0"/>
+                                  <a:ea typeface="Cambria Math"/>
+                                  <a:cs typeface="Times New Roman" pitchFamily="18" charset="0"/>
+                                </a:rPr>
+                              </m:ctrlPr>
+                            </m:accPr>
+                            <m:e>
+                              <m:r>
+                                <a:rPr lang="en-US" b="0" i="1" smtClean="0">
+                                  <a:solidFill>
+                                    <a:schemeClr val="tx1"/>
+                                  </a:solidFill>
+                                  <a:latin typeface="Cambria Math"/>
+                                  <a:ea typeface="Cambria Math"/>
+                                  <a:cs typeface="Times New Roman" pitchFamily="18" charset="0"/>
+                                </a:rPr>
+                                <m:t>𝑘</m:t>
+                              </m:r>
+                            </m:e>
+                          </m:acc>
+                        </m:e>
+                        <m:sub>
+                          <m:r>
+                            <m:rPr>
+                              <m:sty m:val="p"/>
+                            </m:rPr>
+                            <a:rPr lang="en-US" b="0" i="0" smtClean="0">
+                              <a:solidFill>
+                                <a:schemeClr val="tx1"/>
+                              </a:solidFill>
+                              <a:latin typeface="Cambria Math"/>
+                              <a:ea typeface="Cambria Math"/>
+                              <a:cs typeface="Times New Roman" pitchFamily="18" charset="0"/>
+                            </a:rPr>
+                            <m:t>ins</m:t>
+                          </m:r>
+                        </m:sub>
+                      </m:sSub>
+                    </m:oMath>
+                  </m:oMathPara>
+                </a14:m>
+                <a:endParaRPr lang="en-US" baseline="-25000" dirty="0">
+                  <a:solidFill>
+                    <a:schemeClr val="tx1"/>
+                  </a:solidFill>
+                  <a:latin typeface="NimbusRomNo9L" panose="01010103010101010101" pitchFamily="2" charset="0"/>
+                  <a:cs typeface="Times New Roman" pitchFamily="18" charset="0"/>
+                </a:endParaRPr>
+              </a:p>
+            </p:txBody>
+          </p:sp>
+        </mc:Choice>
+        <mc:Fallback>
+          <p:sp>
+            <p:nvSpPr>
+              <p:cNvPr id="113" name="Rectangle 112"/>
+              <p:cNvSpPr>
+                <a:spLocks noRot="1" noChangeAspect="1" noMove="1" noResize="1" noEditPoints="1" noAdjustHandles="1" noChangeArrowheads="1" noChangeShapeType="1" noTextEdit="1"/>
+              </p:cNvSpPr>
+              <p:nvPr/>
+            </p:nvSpPr>
+            <p:spPr>
+              <a:xfrm>
+                <a:off x="2918726" y="241050"/>
+                <a:ext cx="585704" cy="274778"/>
+              </a:xfrm>
+              <a:prstGeom prst="rect">
+                <a:avLst/>
+              </a:prstGeom>
+              <a:blipFill rotWithShape="0">
+                <a:blip r:embed="rId5"/>
+                <a:stretch>
+                  <a:fillRect/>
+                </a:stretch>
+              </a:blipFill>
+              <a:ln w="28575">
+                <a:noFill/>
+              </a:ln>
+            </p:spPr>
+            <p:txBody>
+              <a:bodyPr/>
+              <a:lstStyle/>
+              <a:p>
+                <a:r>
+                  <a:rPr lang="en-US">
+                    <a:noFill/>
+                  </a:rPr>
+                  <a:t> </a:t>
+                </a:r>
+              </a:p>
+            </p:txBody>
+          </p:sp>
+        </mc:Fallback>
+      </mc:AlternateContent>
+      <p:sp>
+        <p:nvSpPr>
+          <p:cNvPr id="114" name="Rectangle 113"/>
+          <p:cNvSpPr/>
+          <p:nvPr/>
+        </p:nvSpPr>
+        <p:spPr>
+          <a:xfrm>
+            <a:off x="2019300" y="248388"/>
+            <a:ext cx="824334" cy="549556"/>
+          </a:xfrm>
+          <a:prstGeom prst="rect">
+            <a:avLst/>
+          </a:prstGeom>
+          <a:solidFill>
+            <a:schemeClr val="bg1"/>
+          </a:solidFill>
+          <a:ln w="28575">
+            <a:solidFill>
+              <a:schemeClr val="tx1"/>
+            </a:solidFill>
+          </a:ln>
+        </p:spPr>
+        <p:style>
+          <a:lnRef idx="2">
+            <a:schemeClr val="accent1">
+              <a:shade val="50000"/>
+            </a:schemeClr>
+          </a:lnRef>
+          <a:fillRef idx="1">
+            <a:schemeClr val="accent1"/>
+          </a:fillRef>
+          <a:effectRef idx="0">
+            <a:schemeClr val="accent1"/>
+          </a:effectRef>
+          <a:fontRef idx="minor">
+            <a:schemeClr val="lt1"/>
+          </a:fontRef>
+        </p:style>
+        <p:txBody>
+          <a:bodyPr rtlCol="0" anchor="ctr"/>
+          <a:lstStyle/>
+          <a:p>
+            <a:pPr algn="ctr"/>
+            <a:r>
+              <a:rPr lang="en-US" b="1" dirty="0" smtClean="0">
+                <a:solidFill>
+                  <a:schemeClr val="tx1"/>
+                </a:solidFill>
+                <a:latin typeface="NimbusRomNo9L" panose="01010103010101010101" pitchFamily="2" charset="0"/>
+                <a:cs typeface="Times New Roman" pitchFamily="18" charset="0"/>
+              </a:rPr>
+              <a:t>Duty-Cycle Controller</a:t>
+            </a:r>
+          </a:p>
+        </p:txBody>
+      </p:sp>
+      <p:cxnSp>
+        <p:nvCxnSpPr>
+          <p:cNvPr id="115" name="Straight Arrow Connector 114"/>
+          <p:cNvCxnSpPr>
+            <a:stCxn id="114" idx="3"/>
+            <a:endCxn id="112" idx="1"/>
+          </p:cNvCxnSpPr>
+          <p:nvPr/>
+        </p:nvCxnSpPr>
+        <p:spPr>
+          <a:xfrm>
+            <a:off x="2843634" y="523166"/>
+            <a:ext cx="713532" cy="0"/>
+          </a:xfrm>
+          <a:prstGeom prst="straightConnector1">
+            <a:avLst/>
+          </a:prstGeom>
+          <a:solidFill>
+            <a:schemeClr val="bg1"/>
+          </a:solidFill>
+          <a:ln w="19050">
+            <a:solidFill>
+              <a:schemeClr val="tx1"/>
+            </a:solidFill>
+            <a:headEnd type="none" w="med" len="med"/>
+            <a:tailEnd type="stealth" w="lg" len="lg"/>
+          </a:ln>
+        </p:spPr>
+        <p:style>
+          <a:lnRef idx="2">
+            <a:schemeClr val="accent1">
+              <a:shade val="50000"/>
+            </a:schemeClr>
+          </a:lnRef>
+          <a:fillRef idx="1">
+            <a:schemeClr val="accent1"/>
+          </a:fillRef>
+          <a:effectRef idx="0">
+            <a:schemeClr val="accent1"/>
+          </a:effectRef>
+          <a:fontRef idx="minor">
+            <a:schemeClr val="lt1"/>
+          </a:fontRef>
+        </p:style>
+      </p:cxnSp>
+      <p:sp>
+        <p:nvSpPr>
+          <p:cNvPr id="116" name="Rectangle 115"/>
+          <p:cNvSpPr/>
+          <p:nvPr/>
+        </p:nvSpPr>
+        <p:spPr>
+          <a:xfrm>
+            <a:off x="1905001" y="896262"/>
+            <a:ext cx="2438401" cy="188051"/>
+          </a:xfrm>
+          <a:prstGeom prst="rect">
+            <a:avLst/>
+          </a:prstGeom>
+          <a:noFill/>
+          <a:ln w="28575">
+            <a:noFill/>
+          </a:ln>
+        </p:spPr>
+        <p:style>
+          <a:lnRef idx="2">
+            <a:schemeClr val="accent1">
+              <a:shade val="50000"/>
+            </a:schemeClr>
+          </a:lnRef>
+          <a:fillRef idx="1">
+            <a:schemeClr val="accent1"/>
+          </a:fillRef>
+          <a:effectRef idx="0">
+            <a:schemeClr val="accent1"/>
+          </a:effectRef>
+          <a:fontRef idx="minor">
+            <a:schemeClr val="lt1"/>
+          </a:fontRef>
+        </p:style>
+        <p:txBody>
+          <a:bodyPr rtlCol="0" anchor="ctr"/>
+          <a:lstStyle/>
+          <a:p>
+            <a:pPr algn="ctr"/>
+            <a:r>
+              <a:rPr lang="en-US" b="1" dirty="0" smtClean="0">
+                <a:solidFill>
+                  <a:schemeClr val="tx1"/>
+                </a:solidFill>
+                <a:latin typeface="NimbusRomNo9L" panose="01010103010101010101" pitchFamily="2" charset="0"/>
+                <a:cs typeface="Times New Roman" pitchFamily="18" charset="0"/>
+              </a:rPr>
+              <a:t>Robot Controller</a:t>
+            </a:r>
+            <a:endParaRPr lang="en-US" b="1" dirty="0">
+              <a:solidFill>
+                <a:schemeClr val="tx1"/>
+              </a:solidFill>
+              <a:latin typeface="NimbusRomNo9L" panose="01010103010101010101" pitchFamily="2" charset="0"/>
+              <a:cs typeface="Times New Roman" pitchFamily="18" charset="0"/>
+            </a:endParaRPr>
+          </a:p>
+        </p:txBody>
+      </p:sp>
+      <p:cxnSp>
+        <p:nvCxnSpPr>
+          <p:cNvPr id="117" name="Straight Arrow Connector 116"/>
+          <p:cNvCxnSpPr>
+            <a:stCxn id="112" idx="3"/>
+            <a:endCxn id="96" idx="1"/>
+          </p:cNvCxnSpPr>
+          <p:nvPr/>
+        </p:nvCxnSpPr>
+        <p:spPr>
+          <a:xfrm>
+            <a:off x="4381500" y="523166"/>
+            <a:ext cx="890166" cy="0"/>
+          </a:xfrm>
+          <a:prstGeom prst="straightConnector1">
+            <a:avLst/>
+          </a:prstGeom>
+          <a:solidFill>
+            <a:schemeClr val="bg1"/>
+          </a:solidFill>
+          <a:ln w="19050">
+            <a:solidFill>
+              <a:schemeClr val="tx1"/>
+            </a:solidFill>
+            <a:headEnd type="none" w="med" len="med"/>
+            <a:tailEnd type="stealth" w="lg" len="lg"/>
+          </a:ln>
+        </p:spPr>
+        <p:style>
+          <a:lnRef idx="2">
+            <a:schemeClr val="accent1">
+              <a:shade val="50000"/>
+            </a:schemeClr>
+          </a:lnRef>
+          <a:fillRef idx="1">
+            <a:schemeClr val="accent1"/>
+          </a:fillRef>
+          <a:effectRef idx="0">
+            <a:schemeClr val="accent1"/>
+          </a:effectRef>
+          <a:fontRef idx="minor">
+            <a:schemeClr val="lt1"/>
+          </a:fontRef>
+        </p:style>
+      </p:cxnSp>
+      <p:cxnSp>
+        <p:nvCxnSpPr>
+          <p:cNvPr id="118" name="Elbow Connector 117"/>
+          <p:cNvCxnSpPr>
+            <a:stCxn id="120" idx="1"/>
+            <a:endCxn id="95" idx="2"/>
+          </p:cNvCxnSpPr>
+          <p:nvPr/>
+        </p:nvCxnSpPr>
+        <p:spPr>
+          <a:xfrm rot="10800000">
+            <a:off x="730834" y="797945"/>
+            <a:ext cx="183567" cy="934245"/>
+          </a:xfrm>
+          <a:prstGeom prst="bentConnector2">
+            <a:avLst/>
+          </a:prstGeom>
+          <a:solidFill>
+            <a:schemeClr val="bg1"/>
+          </a:solidFill>
+          <a:ln w="19050">
+            <a:solidFill>
+              <a:schemeClr val="tx1"/>
+            </a:solidFill>
+            <a:headEnd type="none" w="med" len="med"/>
+            <a:tailEnd type="stealth" w="lg" len="lg"/>
+          </a:ln>
+        </p:spPr>
+        <p:style>
+          <a:lnRef idx="2">
+            <a:schemeClr val="accent1">
+              <a:shade val="50000"/>
+            </a:schemeClr>
+          </a:lnRef>
+          <a:fillRef idx="1">
+            <a:schemeClr val="accent1"/>
+          </a:fillRef>
+          <a:effectRef idx="0">
+            <a:schemeClr val="accent1"/>
+          </a:effectRef>
+          <a:fontRef idx="minor">
+            <a:schemeClr val="lt1"/>
+          </a:fontRef>
+        </p:style>
+      </p:cxnSp>
+      <p:sp>
+        <p:nvSpPr>
+          <p:cNvPr id="119" name="Rectangle 118"/>
+          <p:cNvSpPr/>
+          <p:nvPr/>
+        </p:nvSpPr>
+        <p:spPr>
+          <a:xfrm>
+            <a:off x="4572000" y="152400"/>
+            <a:ext cx="609600" cy="366371"/>
+          </a:xfrm>
+          <a:prstGeom prst="rect">
+            <a:avLst/>
+          </a:prstGeom>
+          <a:noFill/>
+          <a:ln w="28575">
+            <a:noFill/>
+          </a:ln>
+        </p:spPr>
+        <p:style>
+          <a:lnRef idx="2">
+            <a:schemeClr val="accent1">
+              <a:shade val="50000"/>
+            </a:schemeClr>
+          </a:lnRef>
+          <a:fillRef idx="1">
+            <a:schemeClr val="accent1"/>
+          </a:fillRef>
+          <a:effectRef idx="0">
+            <a:schemeClr val="accent1"/>
+          </a:effectRef>
+          <a:fontRef idx="minor">
+            <a:schemeClr val="lt1"/>
+          </a:fontRef>
+        </p:style>
+        <p:txBody>
+          <a:bodyPr lIns="0" rIns="0" rtlCol="0" anchor="ctr"/>
+          <a:lstStyle/>
+          <a:p>
+            <a:pPr algn="ctr"/>
+            <a:r>
+              <a:rPr lang="en-US" dirty="0" smtClean="0">
+                <a:solidFill>
+                  <a:schemeClr val="tx1"/>
+                </a:solidFill>
+                <a:latin typeface="NimbusRomNo9L" panose="01010103010101010101" pitchFamily="2" charset="0"/>
+                <a:cs typeface="Times New Roman" pitchFamily="18" charset="0"/>
+              </a:rPr>
+              <a:t>motor </a:t>
+            </a:r>
+            <a:r>
+              <a:rPr lang="en-US" dirty="0" smtClean="0">
+                <a:solidFill>
+                  <a:schemeClr val="tx1"/>
+                </a:solidFill>
+                <a:latin typeface="NimbusRomNo9L" panose="01010103010101010101" pitchFamily="2" charset="0"/>
+                <a:cs typeface="Times New Roman" pitchFamily="18" charset="0"/>
+              </a:rPr>
+              <a:t/>
+            </a:r>
+            <a:br>
+              <a:rPr lang="en-US" dirty="0" smtClean="0">
+                <a:solidFill>
+                  <a:schemeClr val="tx1"/>
+                </a:solidFill>
+                <a:latin typeface="NimbusRomNo9L" panose="01010103010101010101" pitchFamily="2" charset="0"/>
+                <a:cs typeface="Times New Roman" pitchFamily="18" charset="0"/>
+              </a:rPr>
+            </a:br>
+            <a:r>
+              <a:rPr lang="en-US" dirty="0" smtClean="0">
+                <a:solidFill>
+                  <a:schemeClr val="tx1"/>
+                </a:solidFill>
+                <a:latin typeface="NimbusRomNo9L" panose="01010103010101010101" pitchFamily="2" charset="0"/>
+                <a:cs typeface="Times New Roman" pitchFamily="18" charset="0"/>
+              </a:rPr>
+              <a:t>voltages</a:t>
+            </a:r>
+            <a:endParaRPr lang="en-US" dirty="0">
+              <a:solidFill>
+                <a:schemeClr val="tx1"/>
+              </a:solidFill>
+              <a:latin typeface="NimbusRomNo9L" panose="01010103010101010101" pitchFamily="2" charset="0"/>
+              <a:cs typeface="Times New Roman" pitchFamily="18" charset="0"/>
+            </a:endParaRPr>
+          </a:p>
+        </p:txBody>
+      </p:sp>
+      <p:sp>
+        <p:nvSpPr>
+          <p:cNvPr id="94" name="Rectangle 93"/>
+          <p:cNvSpPr/>
+          <p:nvPr/>
+        </p:nvSpPr>
+        <p:spPr>
+          <a:xfrm>
+            <a:off x="4008372" y="1457411"/>
+            <a:ext cx="824334" cy="549556"/>
+          </a:xfrm>
+          <a:prstGeom prst="rect">
+            <a:avLst/>
+          </a:prstGeom>
+          <a:solidFill>
+            <a:schemeClr val="bg1"/>
+          </a:solidFill>
+          <a:ln w="28575">
+            <a:solidFill>
+              <a:schemeClr val="tx1"/>
+            </a:solidFill>
+          </a:ln>
+        </p:spPr>
+        <p:style>
+          <a:lnRef idx="2">
+            <a:schemeClr val="accent1">
+              <a:shade val="50000"/>
+            </a:schemeClr>
+          </a:lnRef>
+          <a:fillRef idx="1">
+            <a:schemeClr val="accent1"/>
+          </a:fillRef>
+          <a:effectRef idx="0">
+            <a:schemeClr val="accent1"/>
+          </a:effectRef>
+          <a:fontRef idx="minor">
+            <a:schemeClr val="lt1"/>
+          </a:fontRef>
+        </p:style>
+        <p:txBody>
+          <a:bodyPr rtlCol="0" anchor="ctr"/>
+          <a:lstStyle/>
+          <a:p>
+            <a:pPr algn="ctr"/>
+            <a:r>
+              <a:rPr lang="en-US" b="1" dirty="0" smtClean="0">
+                <a:solidFill>
+                  <a:schemeClr val="tx1"/>
+                </a:solidFill>
+                <a:latin typeface="NimbusRomNo9L" panose="01010103010101010101" pitchFamily="2" charset="0"/>
+                <a:cs typeface="Times New Roman" pitchFamily="18" charset="0"/>
+              </a:rPr>
+              <a:t>2-D Image </a:t>
+            </a:r>
+            <a:r>
+              <a:rPr lang="en-US" b="1" dirty="0">
+                <a:solidFill>
+                  <a:schemeClr val="tx1"/>
+                </a:solidFill>
+                <a:latin typeface="NimbusRomNo9L" panose="01010103010101010101" pitchFamily="2" charset="0"/>
+                <a:cs typeface="Times New Roman" pitchFamily="18" charset="0"/>
+              </a:rPr>
+              <a:t>Processing</a:t>
+            </a:r>
+          </a:p>
+        </p:txBody>
+      </p:sp>
+      <mc:AlternateContent xmlns:mc="http://schemas.openxmlformats.org/markup-compatibility/2006">
+        <mc:Choice xmlns:a14="http://schemas.microsoft.com/office/drawing/2010/main" Requires="a14">
+          <p:sp>
+            <p:nvSpPr>
+              <p:cNvPr id="106" name="Rectangle 105"/>
+              <p:cNvSpPr/>
+              <p:nvPr/>
+            </p:nvSpPr>
+            <p:spPr>
+              <a:xfrm>
+                <a:off x="3177901" y="1469644"/>
                 <a:ext cx="971773" cy="274778"/>
               </a:xfrm>
               <a:prstGeom prst="rect">
@@ -4196,171 +4951,139 @@
               <a:p>
                 <a:pPr algn="ctr"/>
                 <a14:m>
-                  <m:oMath xmlns:m="http://schemas.openxmlformats.org/officeDocument/2006/math">
-                    <m:sSup>
-                      <m:sSupPr>
-                        <m:ctrlPr>
-                          <a:rPr lang="en-US" sz="1100" b="1" i="1" smtClean="0">
-                            <a:solidFill>
-                              <a:schemeClr val="tx1"/>
-                            </a:solidFill>
-                            <a:latin typeface="Cambria Math" panose="02040503050406030204" pitchFamily="18" charset="0"/>
-                            <a:ea typeface="Cambria Math"/>
-                            <a:cs typeface="Times New Roman" pitchFamily="18" charset="0"/>
-                          </a:rPr>
-                        </m:ctrlPr>
-                      </m:sSupPr>
-                      <m:e>
-                        <m:r>
-                          <a:rPr lang="en-US" sz="1100" b="1" i="1" smtClean="0">
-                            <a:solidFill>
-                              <a:schemeClr val="tx1"/>
-                            </a:solidFill>
-                            <a:latin typeface="Cambria Math"/>
-                            <a:ea typeface="Cambria Math"/>
-                            <a:cs typeface="Times New Roman" pitchFamily="18" charset="0"/>
-                          </a:rPr>
-                          <m:t>𝒅</m:t>
-                        </m:r>
-                      </m:e>
-                      <m:sup>
-                        <m:r>
-                          <a:rPr lang="en-US" sz="1100" b="1" i="1" smtClean="0">
-                            <a:solidFill>
-                              <a:schemeClr val="tx1"/>
-                            </a:solidFill>
-                            <a:latin typeface="Cambria Math"/>
-                            <a:ea typeface="Cambria Math"/>
-                            <a:cs typeface="Times New Roman" pitchFamily="18" charset="0"/>
-                          </a:rPr>
-                          <m:t>(</m:t>
-                        </m:r>
-                        <m:r>
-                          <a:rPr lang="en-US" sz="1100" b="1" i="1" smtClean="0">
-                            <a:solidFill>
-                              <a:schemeClr val="tx1"/>
-                            </a:solidFill>
-                            <a:latin typeface="Cambria Math"/>
-                            <a:ea typeface="Cambria Math"/>
-                            <a:cs typeface="Times New Roman" pitchFamily="18" charset="0"/>
-                          </a:rPr>
-                          <m:t>𝟎</m:t>
-                        </m:r>
-                        <m:r>
-                          <a:rPr lang="en-US" sz="1100" b="1" i="1" smtClean="0">
-                            <a:solidFill>
-                              <a:schemeClr val="tx1"/>
-                            </a:solidFill>
-                            <a:latin typeface="Cambria Math"/>
-                            <a:ea typeface="Cambria Math"/>
-                            <a:cs typeface="Times New Roman" pitchFamily="18" charset="0"/>
-                          </a:rPr>
-                          <m:t>)</m:t>
-                        </m:r>
-                      </m:sup>
-                    </m:sSup>
-                    <m:r>
-                      <a:rPr lang="en-US" sz="1100" b="1" i="1" smtClean="0">
-                        <a:solidFill>
-                          <a:schemeClr val="tx1"/>
-                        </a:solidFill>
-                        <a:latin typeface="Cambria Math"/>
-                        <a:ea typeface="Cambria Math"/>
-                        <a:cs typeface="Times New Roman" pitchFamily="18" charset="0"/>
-                      </a:rPr>
-                      <m:t>,…,</m:t>
-                    </m:r>
-                  </m:oMath>
+                  <m:oMathPara xmlns:m="http://schemas.openxmlformats.org/officeDocument/2006/math">
+                    <m:oMathParaPr>
+                      <m:jc m:val="centerGroup"/>
+                    </m:oMathParaPr>
+                    <m:oMath xmlns:m="http://schemas.openxmlformats.org/officeDocument/2006/math">
+                      <m:sSup>
+                        <m:sSupPr>
+                          <m:ctrlPr>
+                            <a:rPr lang="en-US" i="1" smtClean="0">
+                              <a:solidFill>
+                                <a:schemeClr val="tx1"/>
+                              </a:solidFill>
+                              <a:latin typeface="Cambria Math" panose="02040503050406030204" pitchFamily="18" charset="0"/>
+                              <a:ea typeface="Cambria Math"/>
+                              <a:cs typeface="Times New Roman" pitchFamily="18" charset="0"/>
+                            </a:rPr>
+                          </m:ctrlPr>
+                        </m:sSupPr>
+                        <m:e>
+                          <m:r>
+                            <a:rPr lang="en-US" b="0" i="1" smtClean="0">
+                              <a:solidFill>
+                                <a:schemeClr val="tx1"/>
+                              </a:solidFill>
+                              <a:latin typeface="Cambria Math"/>
+                              <a:ea typeface="Cambria Math"/>
+                              <a:cs typeface="Times New Roman" pitchFamily="18" charset="0"/>
+                            </a:rPr>
+                            <m:t>𝑑</m:t>
+                          </m:r>
+                        </m:e>
+                        <m:sup>
+                          <m:r>
+                            <a:rPr lang="en-US" b="0" i="1" smtClean="0">
+                              <a:solidFill>
+                                <a:schemeClr val="tx1"/>
+                              </a:solidFill>
+                              <a:latin typeface="Cambria Math"/>
+                              <a:ea typeface="Cambria Math"/>
+                              <a:cs typeface="Times New Roman" pitchFamily="18" charset="0"/>
+                            </a:rPr>
+                            <m:t>(0)</m:t>
+                          </m:r>
+                        </m:sup>
+                      </m:sSup>
+                      <m:r>
+                        <a:rPr lang="en-US" b="0" i="1" smtClean="0">
+                          <a:solidFill>
+                            <a:schemeClr val="tx1"/>
+                          </a:solidFill>
+                          <a:latin typeface="Cambria Math"/>
+                          <a:ea typeface="Cambria Math"/>
+                          <a:cs typeface="Times New Roman" pitchFamily="18" charset="0"/>
+                        </a:rPr>
+                        <m:t>,…,</m:t>
+                      </m:r>
+                      <m:sSup>
+                        <m:sSupPr>
+                          <m:ctrlPr>
+                            <a:rPr lang="en-US" i="1" smtClean="0">
+                              <a:solidFill>
+                                <a:schemeClr val="tx1"/>
+                              </a:solidFill>
+                              <a:latin typeface="Cambria Math" panose="02040503050406030204" pitchFamily="18" charset="0"/>
+                              <a:ea typeface="Cambria Math"/>
+                              <a:cs typeface="Times New Roman" pitchFamily="18" charset="0"/>
+                            </a:rPr>
+                          </m:ctrlPr>
+                        </m:sSupPr>
+                        <m:e>
+                          <m:r>
+                            <a:rPr lang="en-US" b="0" i="1" smtClean="0">
+                              <a:solidFill>
+                                <a:schemeClr val="tx1"/>
+                              </a:solidFill>
+                              <a:latin typeface="Cambria Math"/>
+                              <a:ea typeface="Cambria Math"/>
+                              <a:cs typeface="Times New Roman" pitchFamily="18" charset="0"/>
+                            </a:rPr>
+                            <m:t> </m:t>
+                          </m:r>
+                          <m:r>
+                            <a:rPr lang="en-US" b="0" i="1" smtClean="0">
+                              <a:solidFill>
+                                <a:schemeClr val="tx1"/>
+                              </a:solidFill>
+                              <a:latin typeface="Cambria Math"/>
+                              <a:ea typeface="Cambria Math"/>
+                              <a:cs typeface="Times New Roman" pitchFamily="18" charset="0"/>
+                            </a:rPr>
+                            <m:t>𝑑</m:t>
+                          </m:r>
+                        </m:e>
+                        <m:sup>
+                          <m:r>
+                            <a:rPr lang="en-US" b="0" i="1" smtClean="0">
+                              <a:solidFill>
+                                <a:schemeClr val="tx1"/>
+                              </a:solidFill>
+                              <a:latin typeface="Cambria Math"/>
+                              <a:ea typeface="Cambria Math"/>
+                              <a:cs typeface="Times New Roman" pitchFamily="18" charset="0"/>
+                            </a:rPr>
+                            <m:t>(</m:t>
+                          </m:r>
+                          <m:r>
+                            <a:rPr lang="en-US" b="0" i="1" smtClean="0">
+                              <a:solidFill>
+                                <a:schemeClr val="tx1"/>
+                              </a:solidFill>
+                              <a:latin typeface="Cambria Math"/>
+                              <a:ea typeface="Cambria Math"/>
+                              <a:cs typeface="Times New Roman" pitchFamily="18" charset="0"/>
+                            </a:rPr>
+                            <m:t>𝑁</m:t>
+                          </m:r>
+                          <m:r>
+                            <a:rPr lang="en-US" b="0" i="1" smtClean="0">
+                              <a:solidFill>
+                                <a:schemeClr val="tx1"/>
+                              </a:solidFill>
+                              <a:latin typeface="Cambria Math"/>
+                              <a:ea typeface="Cambria Math"/>
+                              <a:cs typeface="Times New Roman" pitchFamily="18" charset="0"/>
+                            </a:rPr>
+                            <m:t>)</m:t>
+                          </m:r>
+                        </m:sup>
+                      </m:sSup>
+                    </m:oMath>
+                  </m:oMathPara>
                 </a14:m>
-                <a:r>
-                  <a:rPr lang="en-US" sz="1100" b="1" dirty="0" smtClean="0">
-                    <a:solidFill>
-                      <a:schemeClr val="tx1"/>
-                    </a:solidFill>
-                    <a:latin typeface="NimbusRomNo9L" panose="01010103010101010101" pitchFamily="2" charset="0"/>
-                    <a:ea typeface="Cambria Math"/>
-                    <a:cs typeface="Times New Roman" pitchFamily="18" charset="0"/>
-                  </a:rPr>
-                  <a:t> </a:t>
-                </a:r>
-                <a14:m>
-                  <m:oMath xmlns:m="http://schemas.openxmlformats.org/officeDocument/2006/math">
-                    <m:sSup>
-                      <m:sSupPr>
-                        <m:ctrlPr>
-                          <a:rPr lang="en-US" sz="1100" b="1" i="1" smtClean="0">
-                            <a:solidFill>
-                              <a:schemeClr val="tx1"/>
-                            </a:solidFill>
-                            <a:latin typeface="Cambria Math" panose="02040503050406030204" pitchFamily="18" charset="0"/>
-                            <a:ea typeface="Cambria Math"/>
-                            <a:cs typeface="Times New Roman" pitchFamily="18" charset="0"/>
-                          </a:rPr>
-                        </m:ctrlPr>
-                      </m:sSupPr>
-                      <m:e>
-                        <m:r>
-                          <a:rPr lang="en-US" sz="1100" b="1" i="1" smtClean="0">
-                            <a:solidFill>
-                              <a:schemeClr val="tx1"/>
-                            </a:solidFill>
-                            <a:latin typeface="Cambria Math"/>
-                            <a:ea typeface="Cambria Math"/>
-                            <a:cs typeface="Times New Roman" pitchFamily="18" charset="0"/>
-                          </a:rPr>
-                          <m:t> </m:t>
-                        </m:r>
-                        <m:r>
-                          <a:rPr lang="en-US" sz="1100" b="1" i="1" smtClean="0">
-                            <a:solidFill>
-                              <a:schemeClr val="tx1"/>
-                            </a:solidFill>
-                            <a:latin typeface="Cambria Math"/>
-                            <a:ea typeface="Cambria Math"/>
-                            <a:cs typeface="Times New Roman" pitchFamily="18" charset="0"/>
-                          </a:rPr>
-                          <m:t>𝒅</m:t>
-                        </m:r>
-                      </m:e>
-                      <m:sup>
-                        <m:r>
-                          <a:rPr lang="en-US" sz="1100" b="1" i="1" smtClean="0">
-                            <a:solidFill>
-                              <a:schemeClr val="tx1"/>
-                            </a:solidFill>
-                            <a:latin typeface="Cambria Math"/>
-                            <a:ea typeface="Cambria Math"/>
-                            <a:cs typeface="Times New Roman" pitchFamily="18" charset="0"/>
-                          </a:rPr>
-                          <m:t>(</m:t>
-                        </m:r>
-                        <m:r>
-                          <a:rPr lang="en-US" sz="1100" b="1" i="1" smtClean="0">
-                            <a:solidFill>
-                              <a:schemeClr val="tx1"/>
-                            </a:solidFill>
-                            <a:latin typeface="Cambria Math"/>
-                            <a:ea typeface="Cambria Math"/>
-                            <a:cs typeface="Times New Roman" pitchFamily="18" charset="0"/>
-                          </a:rPr>
-                          <m:t>𝑵</m:t>
-                        </m:r>
-                        <m:r>
-                          <a:rPr lang="en-US" sz="1100" b="1" i="1" smtClean="0">
-                            <a:solidFill>
-                              <a:schemeClr val="tx1"/>
-                            </a:solidFill>
-                            <a:latin typeface="Cambria Math"/>
-                            <a:ea typeface="Cambria Math"/>
-                            <a:cs typeface="Times New Roman" pitchFamily="18" charset="0"/>
-                          </a:rPr>
-                          <m:t>)</m:t>
-                        </m:r>
-                      </m:sup>
-                    </m:sSup>
-                  </m:oMath>
-                </a14:m>
-                <a:endParaRPr lang="en-US" sz="1100" b="1" i="1" dirty="0">
+                <a:endParaRPr lang="en-US" i="1" dirty="0">
                   <a:solidFill>
                     <a:schemeClr val="tx1"/>
                   </a:solidFill>
@@ -4371,10 +5094,10 @@
             </p:txBody>
           </p:sp>
         </mc:Choice>
-        <mc:Fallback xmlns="">
+        <mc:Fallback>
           <p:sp>
             <p:nvSpPr>
-              <p:cNvPr id="46" name="Rectangle 45"/>
+              <p:cNvPr id="106" name="Rectangle 105"/>
               <p:cNvSpPr>
                 <a:spLocks noRot="1" noChangeAspect="1" noMove="1" noResize="1" noEditPoints="1" noAdjustHandles="1" noChangeArrowheads="1" noChangeShapeType="1" noTextEdit="1"/>
               </p:cNvSpPr>
@@ -4382,14 +5105,14 @@
             </p:nvSpPr>
             <p:spPr>
               <a:xfrm>
-                <a:off x="2057400" y="1457411"/>
+                <a:off x="3177901" y="1469644"/>
                 <a:ext cx="971773" cy="274778"/>
               </a:xfrm>
               <a:prstGeom prst="rect">
                 <a:avLst/>
               </a:prstGeom>
-              <a:blipFill rotWithShape="1">
-                <a:blip r:embed="rId5"/>
+              <a:blipFill rotWithShape="0">
+                <a:blip r:embed="rId6"/>
                 <a:stretch>
                   <a:fillRect/>
                 </a:stretch>
@@ -4415,13 +5138,13 @@
       </mc:AlternateContent>
       <p:sp>
         <p:nvSpPr>
-          <p:cNvPr id="47" name="Rectangle 46"/>
+          <p:cNvPr id="107" name="Rectangle 106"/>
           <p:cNvSpPr/>
           <p:nvPr/>
         </p:nvSpPr>
         <p:spPr>
           <a:xfrm>
-            <a:off x="1297690" y="1457411"/>
+            <a:off x="2359704" y="1457411"/>
             <a:ext cx="824334" cy="549556"/>
           </a:xfrm>
           <a:prstGeom prst="rect">
@@ -4458,7 +5181,7 @@
           <a:p>
             <a:pPr algn="ctr"/>
             <a:r>
-              <a:rPr lang="en-US" sz="1100" b="1" dirty="0" smtClean="0">
+              <a:rPr lang="en-US" b="1" dirty="0" smtClean="0">
                 <a:solidFill>
                   <a:schemeClr val="tx1"/>
                 </a:solidFill>
@@ -4471,7 +5194,7 @@
           <a:p>
             <a:pPr algn="ctr"/>
             <a:r>
-              <a:rPr lang="en-US" sz="1100" b="1" dirty="0" smtClean="0">
+              <a:rPr lang="en-US" b="1" dirty="0" smtClean="0">
                 <a:solidFill>
                   <a:schemeClr val="tx1"/>
                 </a:solidFill>
@@ -4485,16 +5208,16 @@
       </p:sp>
       <p:cxnSp>
         <p:nvCxnSpPr>
-          <p:cNvPr id="48" name="Straight Arrow Connector 47"/>
+          <p:cNvPr id="108" name="Straight Arrow Connector 107"/>
           <p:cNvCxnSpPr>
-            <a:stCxn id="34" idx="1"/>
-            <a:endCxn id="47" idx="3"/>
+            <a:stCxn id="94" idx="1"/>
+            <a:endCxn id="107" idx="3"/>
           </p:cNvCxnSpPr>
           <p:nvPr/>
         </p:nvCxnSpPr>
         <p:spPr>
           <a:xfrm flipH="1">
-            <a:off x="2122024" y="1732189"/>
+            <a:off x="3184038" y="1732189"/>
             <a:ext cx="824334" cy="0"/>
           </a:xfrm>
           <a:prstGeom prst="straightConnector1">
@@ -4528,17 +5251,17 @@
           </a:fontRef>
         </p:style>
       </p:cxnSp>
-      <mc:AlternateContent xmlns:mc="http://schemas.openxmlformats.org/markup-compatibility/2006" xmlns:a14="http://schemas.microsoft.com/office/drawing/2010/main">
-        <mc:Choice Requires="a14">
+      <mc:AlternateContent xmlns:mc="http://schemas.openxmlformats.org/markup-compatibility/2006">
+        <mc:Choice xmlns:a14="http://schemas.microsoft.com/office/drawing/2010/main" Requires="a14">
           <p:sp>
             <p:nvSpPr>
-              <p:cNvPr id="49" name="Rectangle 48"/>
+              <p:cNvPr id="109" name="Rectangle 108"/>
               <p:cNvSpPr/>
               <p:nvPr/>
             </p:nvSpPr>
             <p:spPr>
               <a:xfrm>
-                <a:off x="323278" y="1229040"/>
+                <a:off x="1905000" y="1469644"/>
                 <a:ext cx="412167" cy="274778"/>
               </a:xfrm>
               <a:prstGeom prst="rect">
@@ -4577,7 +5300,7 @@
                     </m:oMathParaPr>
                     <m:oMath xmlns:m="http://schemas.openxmlformats.org/officeDocument/2006/math">
                       <m:r>
-                        <a:rPr lang="en-US" sz="1100" b="1" i="1" smtClean="0">
+                        <a:rPr lang="en-US" b="0" i="1" smtClean="0">
                           <a:solidFill>
                             <a:schemeClr val="tx1"/>
                           </a:solidFill>
@@ -4585,10 +5308,10 @@
                           <a:ea typeface="Cambria Math"/>
                           <a:cs typeface="Times New Roman" pitchFamily="18" charset="0"/>
                         </a:rPr>
-                        <m:t>𝒂</m:t>
+                        <m:t>𝑎</m:t>
                       </m:r>
                       <m:r>
-                        <a:rPr lang="en-US" sz="1100" b="1" i="1" smtClean="0">
+                        <a:rPr lang="en-US" b="0" i="1" smtClean="0">
                           <a:solidFill>
                             <a:schemeClr val="tx1"/>
                           </a:solidFill>
@@ -4599,7 +5322,7 @@
                         <m:t>,</m:t>
                       </m:r>
                       <m:r>
-                        <a:rPr lang="en-US" sz="1100" b="1" i="1" smtClean="0">
+                        <a:rPr lang="en-US" b="0" i="1" smtClean="0">
                           <a:solidFill>
                             <a:schemeClr val="tx1"/>
                           </a:solidFill>
@@ -4607,12 +5330,12 @@
                           <a:ea typeface="Cambria Math"/>
                           <a:cs typeface="Times New Roman" pitchFamily="18" charset="0"/>
                         </a:rPr>
-                        <m:t>𝒃</m:t>
+                        <m:t>𝑏</m:t>
                       </m:r>
                     </m:oMath>
                   </m:oMathPara>
                 </a14:m>
-                <a:endParaRPr lang="en-US" sz="1100" b="1" i="1" dirty="0">
+                <a:endParaRPr lang="en-US" i="1" dirty="0">
                   <a:solidFill>
                     <a:schemeClr val="tx1"/>
                   </a:solidFill>
@@ -4623,10 +5346,10 @@
             </p:txBody>
           </p:sp>
         </mc:Choice>
-        <mc:Fallback xmlns="">
+        <mc:Fallback>
           <p:sp>
             <p:nvSpPr>
-              <p:cNvPr id="49" name="Rectangle 48"/>
+              <p:cNvPr id="109" name="Rectangle 108"/>
               <p:cNvSpPr>
                 <a:spLocks noRot="1" noChangeAspect="1" noMove="1" noResize="1" noEditPoints="1" noAdjustHandles="1" noChangeArrowheads="1" noChangeShapeType="1" noTextEdit="1"/>
               </p:cNvSpPr>
@@ -4634,14 +5357,14 @@
             </p:nvSpPr>
             <p:spPr>
               <a:xfrm>
-                <a:off x="323278" y="1229040"/>
+                <a:off x="1905000" y="1469644"/>
                 <a:ext cx="412167" cy="274778"/>
               </a:xfrm>
               <a:prstGeom prst="rect">
                 <a:avLst/>
               </a:prstGeom>
-              <a:blipFill rotWithShape="1">
-                <a:blip r:embed="rId6"/>
+              <a:blipFill rotWithShape="0">
+                <a:blip r:embed="rId7"/>
                 <a:stretch>
                   <a:fillRect/>
                 </a:stretch>
@@ -4667,21 +5390,25 @@
       </mc:AlternateContent>
       <p:sp>
         <p:nvSpPr>
-          <p:cNvPr id="50" name="Rectangle 49"/>
+          <p:cNvPr id="120" name="Rectangle 119"/>
           <p:cNvSpPr/>
           <p:nvPr/>
         </p:nvSpPr>
         <p:spPr>
           <a:xfrm>
-            <a:off x="1205746" y="2097949"/>
-            <a:ext cx="2667000" cy="188051"/>
+            <a:off x="914400" y="1457411"/>
+            <a:ext cx="896112" cy="549556"/>
           </a:xfrm>
           <a:prstGeom prst="rect">
             <a:avLst/>
           </a:prstGeom>
-          <a:noFill/>
+          <a:solidFill>
+            <a:schemeClr val="bg1"/>
+          </a:solidFill>
           <a:ln w="28575">
-            <a:noFill/>
+            <a:solidFill>
+              <a:schemeClr val="tx1"/>
+            </a:solidFill>
           </a:ln>
         </p:spPr>
         <p:style>
@@ -4706,16 +5433,16 @@
           <a:p>
             <a:pPr algn="ctr"/>
             <a:r>
-              <a:rPr lang="en-US" sz="1100" b="1" dirty="0" smtClean="0">
+              <a:rPr lang="en-US" b="1" dirty="0" smtClean="0">
                 <a:solidFill>
                   <a:schemeClr val="tx1"/>
                 </a:solidFill>
                 <a:latin typeface="NimbusRomNo9L" panose="01010103010101010101" pitchFamily="2" charset="0"/>
                 <a:cs typeface="Times New Roman" pitchFamily="18" charset="0"/>
               </a:rPr>
-              <a:t>Needle Segmentation</a:t>
-            </a:r>
-            <a:endParaRPr lang="en-US" sz="1100" b="1" dirty="0">
+              <a:t>Tip Pose Measurement</a:t>
+            </a:r>
+            <a:endParaRPr lang="en-US" b="1" dirty="0">
               <a:solidFill>
                 <a:schemeClr val="tx1"/>
               </a:solidFill>
@@ -4725,508 +5452,119 @@
           </a:p>
         </p:txBody>
       </p:sp>
-      <p:grpSp>
-        <p:nvGrpSpPr>
-          <p:cNvPr id="51" name="Group 50"/>
-          <p:cNvGrpSpPr/>
-          <p:nvPr/>
-        </p:nvGrpSpPr>
-        <p:grpSpPr>
-          <a:xfrm>
-            <a:off x="1695282" y="228600"/>
-            <a:ext cx="2248239" cy="569344"/>
-            <a:chOff x="1866561" y="152400"/>
-            <a:chExt cx="2248239" cy="569344"/>
-          </a:xfrm>
-        </p:grpSpPr>
-        <p:sp>
-          <p:nvSpPr>
-            <p:cNvPr id="52" name="Rectangle 51"/>
-            <p:cNvSpPr/>
-            <p:nvPr/>
-          </p:nvSpPr>
-          <p:spPr>
-            <a:xfrm>
-              <a:off x="3290466" y="172188"/>
-              <a:ext cx="824334" cy="549556"/>
-            </a:xfrm>
-            <a:prstGeom prst="rect">
-              <a:avLst/>
-            </a:prstGeom>
-            <a:solidFill>
-              <a:schemeClr val="bg1"/>
-            </a:solidFill>
-            <a:ln w="28575">
-              <a:solidFill>
-                <a:schemeClr val="tx1"/>
-              </a:solidFill>
-            </a:ln>
-          </p:spPr>
-          <p:style>
-            <a:lnRef idx="2">
-              <a:schemeClr val="accent1">
-                <a:shade val="50000"/>
-              </a:schemeClr>
-            </a:lnRef>
-            <a:fillRef idx="1">
-              <a:schemeClr val="accent1"/>
-            </a:fillRef>
-            <a:effectRef idx="0">
-              <a:schemeClr val="accent1"/>
-            </a:effectRef>
-            <a:fontRef idx="minor">
-              <a:schemeClr val="lt1"/>
-            </a:fontRef>
-          </p:style>
-          <p:txBody>
-            <a:bodyPr rtlCol="0" anchor="ctr"/>
-            <a:lstStyle/>
-            <a:p>
-              <a:pPr algn="ctr"/>
-              <a:r>
-                <a:rPr lang="en-US" sz="1100" b="1" dirty="0" smtClean="0">
-                  <a:solidFill>
-                    <a:schemeClr val="tx1"/>
-                  </a:solidFill>
-                  <a:latin typeface="NimbusRomNo9L" panose="01010103010101010101" pitchFamily="2" charset="0"/>
-                  <a:cs typeface="Times New Roman" pitchFamily="18" charset="0"/>
-                </a:rPr>
-                <a:t>Motor</a:t>
-              </a:r>
-            </a:p>
-            <a:p>
-              <a:pPr algn="ctr"/>
-              <a:r>
-                <a:rPr lang="en-US" sz="1100" b="1" dirty="0" smtClean="0">
-                  <a:solidFill>
-                    <a:schemeClr val="tx1"/>
-                  </a:solidFill>
-                  <a:latin typeface="NimbusRomNo9L" panose="01010103010101010101" pitchFamily="2" charset="0"/>
-                  <a:cs typeface="Times New Roman" pitchFamily="18" charset="0"/>
-                </a:rPr>
-                <a:t>Controllers</a:t>
-              </a:r>
-              <a:endParaRPr lang="en-US" sz="1100" b="1" dirty="0">
-                <a:solidFill>
-                  <a:schemeClr val="tx1"/>
-                </a:solidFill>
-                <a:latin typeface="NimbusRomNo9L" panose="01010103010101010101" pitchFamily="2" charset="0"/>
-                <a:cs typeface="Times New Roman" pitchFamily="18" charset="0"/>
-              </a:endParaRPr>
-            </a:p>
-          </p:txBody>
-        </p:sp>
-        <mc:AlternateContent xmlns:mc="http://schemas.openxmlformats.org/markup-compatibility/2006" xmlns:a14="http://schemas.microsoft.com/office/drawing/2010/main">
-          <mc:Choice Requires="a14">
-            <p:sp>
-              <p:nvSpPr>
-                <p:cNvPr id="53" name="Rectangle 52"/>
-                <p:cNvSpPr/>
-                <p:nvPr/>
-              </p:nvSpPr>
-              <p:spPr>
-                <a:xfrm>
-                  <a:off x="2697828" y="152400"/>
-                  <a:ext cx="585704" cy="274778"/>
-                </a:xfrm>
-                <a:prstGeom prst="rect">
-                  <a:avLst/>
-                </a:prstGeom>
-                <a:noFill/>
-                <a:ln w="28575">
-                  <a:noFill/>
-                </a:ln>
-              </p:spPr>
-              <p:style>
-                <a:lnRef idx="2">
-                  <a:schemeClr val="accent1">
-                    <a:shade val="50000"/>
-                  </a:schemeClr>
-                </a:lnRef>
-                <a:fillRef idx="1">
-                  <a:schemeClr val="accent1"/>
-                </a:fillRef>
-                <a:effectRef idx="0">
-                  <a:schemeClr val="accent1"/>
-                </a:effectRef>
-                <a:fontRef idx="minor">
-                  <a:schemeClr val="lt1"/>
-                </a:fontRef>
-              </p:style>
-              <p:txBody>
-                <a:bodyPr rtlCol="0" anchor="ctr"/>
-                <a:lstStyle/>
-                <a:p>
-                  <a:pPr algn="ctr"/>
-                  <a14:m>
-                    <m:oMathPara xmlns:m="http://schemas.openxmlformats.org/officeDocument/2006/math">
-                      <m:oMathParaPr>
-                        <m:jc m:val="center"/>
-                      </m:oMathParaPr>
-                      <m:oMath xmlns:m="http://schemas.openxmlformats.org/officeDocument/2006/math">
-                        <m:sSub>
-                          <m:sSubPr>
-                            <m:ctrlPr>
-                              <a:rPr lang="en-US" sz="1100" i="1" smtClean="0">
-                                <a:solidFill>
-                                  <a:schemeClr val="tx1"/>
-                                </a:solidFill>
-                                <a:latin typeface="Cambria Math" panose="02040503050406030204" pitchFamily="18" charset="0"/>
-                                <a:ea typeface="Cambria Math"/>
-                                <a:cs typeface="Times New Roman" pitchFamily="18" charset="0"/>
-                              </a:rPr>
-                            </m:ctrlPr>
-                          </m:sSubPr>
-                          <m:e>
-                            <m:acc>
-                              <m:accPr>
-                                <m:chr m:val="̇"/>
-                                <m:ctrlPr>
-                                  <a:rPr lang="en-US" sz="1100" i="1" smtClean="0">
-                                    <a:solidFill>
-                                      <a:schemeClr val="tx1"/>
-                                    </a:solidFill>
-                                    <a:latin typeface="Cambria Math" panose="02040503050406030204" pitchFamily="18" charset="0"/>
-                                    <a:ea typeface="Cambria Math"/>
-                                    <a:cs typeface="Times New Roman" pitchFamily="18" charset="0"/>
-                                  </a:rPr>
-                                </m:ctrlPr>
-                              </m:accPr>
-                              <m:e>
-                                <m:r>
-                                  <a:rPr lang="en-US" sz="1100" b="0" i="1" smtClean="0">
-                                    <a:solidFill>
-                                      <a:schemeClr val="tx1"/>
-                                    </a:solidFill>
-                                    <a:latin typeface="Cambria Math"/>
-                                    <a:ea typeface="Cambria Math"/>
-                                    <a:cs typeface="Times New Roman" pitchFamily="18" charset="0"/>
-                                  </a:rPr>
-                                  <m:t>𝑘</m:t>
-                                </m:r>
-                              </m:e>
-                            </m:acc>
-                          </m:e>
-                          <m:sub>
-                            <m:r>
-                              <m:rPr>
-                                <m:sty m:val="p"/>
-                              </m:rPr>
-                              <a:rPr lang="en-US" sz="1100" b="0" i="0" smtClean="0">
-                                <a:solidFill>
-                                  <a:schemeClr val="tx1"/>
-                                </a:solidFill>
-                                <a:latin typeface="Cambria Math"/>
-                                <a:ea typeface="Cambria Math"/>
-                                <a:cs typeface="Times New Roman" pitchFamily="18" charset="0"/>
-                              </a:rPr>
-                              <m:t>rot</m:t>
-                            </m:r>
-                          </m:sub>
-                        </m:sSub>
-                        <m:r>
-                          <a:rPr lang="en-US" sz="1100" b="0" i="1" smtClean="0">
-                            <a:solidFill>
-                              <a:schemeClr val="tx1"/>
-                            </a:solidFill>
-                            <a:latin typeface="Cambria Math"/>
-                            <a:ea typeface="Cambria Math"/>
-                            <a:cs typeface="Times New Roman" pitchFamily="18" charset="0"/>
-                          </a:rPr>
-                          <m:t>, </m:t>
-                        </m:r>
-                        <m:sSub>
-                          <m:sSubPr>
-                            <m:ctrlPr>
-                              <a:rPr lang="en-US" sz="1100" i="1" smtClean="0">
-                                <a:solidFill>
-                                  <a:schemeClr val="tx1"/>
-                                </a:solidFill>
-                                <a:latin typeface="Cambria Math" panose="02040503050406030204" pitchFamily="18" charset="0"/>
-                                <a:ea typeface="Cambria Math"/>
-                                <a:cs typeface="Times New Roman" pitchFamily="18" charset="0"/>
-                              </a:rPr>
-                            </m:ctrlPr>
-                          </m:sSubPr>
-                          <m:e>
-                            <m:acc>
-                              <m:accPr>
-                                <m:chr m:val="̇"/>
-                                <m:ctrlPr>
-                                  <a:rPr lang="en-US" sz="1100" i="1" smtClean="0">
-                                    <a:solidFill>
-                                      <a:schemeClr val="tx1"/>
-                                    </a:solidFill>
-                                    <a:latin typeface="Cambria Math" panose="02040503050406030204" pitchFamily="18" charset="0"/>
-                                    <a:ea typeface="Cambria Math"/>
-                                    <a:cs typeface="Times New Roman" pitchFamily="18" charset="0"/>
-                                  </a:rPr>
-                                </m:ctrlPr>
-                              </m:accPr>
-                              <m:e>
-                                <m:r>
-                                  <a:rPr lang="en-US" sz="1100" b="0" i="1" smtClean="0">
-                                    <a:solidFill>
-                                      <a:schemeClr val="tx1"/>
-                                    </a:solidFill>
-                                    <a:latin typeface="Cambria Math"/>
-                                    <a:ea typeface="Cambria Math"/>
-                                    <a:cs typeface="Times New Roman" pitchFamily="18" charset="0"/>
-                                  </a:rPr>
-                                  <m:t>𝑘</m:t>
-                                </m:r>
-                              </m:e>
-                            </m:acc>
-                          </m:e>
-                          <m:sub>
-                            <m:r>
-                              <m:rPr>
-                                <m:sty m:val="p"/>
-                              </m:rPr>
-                              <a:rPr lang="en-US" sz="1100" b="0" i="0" smtClean="0">
-                                <a:solidFill>
-                                  <a:schemeClr val="tx1"/>
-                                </a:solidFill>
-                                <a:latin typeface="Cambria Math"/>
-                                <a:ea typeface="Cambria Math"/>
-                                <a:cs typeface="Times New Roman" pitchFamily="18" charset="0"/>
-                              </a:rPr>
-                              <m:t>ins</m:t>
-                            </m:r>
-                          </m:sub>
-                        </m:sSub>
-                      </m:oMath>
-                    </m:oMathPara>
-                  </a14:m>
-                  <a:endParaRPr lang="en-US" sz="1100" baseline="-25000" dirty="0">
-                    <a:solidFill>
-                      <a:schemeClr val="tx1"/>
-                    </a:solidFill>
-                    <a:latin typeface="NimbusRomNo9L" panose="01010103010101010101" pitchFamily="2" charset="0"/>
-                    <a:cs typeface="Times New Roman" pitchFamily="18" charset="0"/>
-                  </a:endParaRPr>
-                </a:p>
-              </p:txBody>
-            </p:sp>
-          </mc:Choice>
-          <mc:Fallback xmlns="">
-            <p:sp>
-              <p:nvSpPr>
-                <p:cNvPr id="53" name="Rectangle 52"/>
-                <p:cNvSpPr>
-                  <a:spLocks noRot="1" noChangeAspect="1" noMove="1" noResize="1" noEditPoints="1" noAdjustHandles="1" noChangeArrowheads="1" noChangeShapeType="1" noTextEdit="1"/>
-                </p:cNvSpPr>
-                <p:nvPr/>
-              </p:nvSpPr>
-              <p:spPr>
-                <a:xfrm>
-                  <a:off x="2697828" y="152400"/>
-                  <a:ext cx="585704" cy="274778"/>
-                </a:xfrm>
-                <a:prstGeom prst="rect">
-                  <a:avLst/>
-                </a:prstGeom>
-                <a:blipFill rotWithShape="1">
-                  <a:blip r:embed="rId7"/>
-                  <a:stretch>
-                    <a:fillRect/>
-                  </a:stretch>
-                </a:blipFill>
-                <a:ln w="28575">
-                  <a:noFill/>
-                </a:ln>
-              </p:spPr>
-              <p:txBody>
-                <a:bodyPr/>
-                <a:lstStyle/>
-                <a:p>
-                  <a:r>
-                    <a:rPr lang="en-US">
-                      <a:noFill/>
-                    </a:rPr>
-                    <a:t> </a:t>
-                  </a:r>
-                </a:p>
-              </p:txBody>
-            </p:sp>
-          </mc:Fallback>
-        </mc:AlternateContent>
-        <p:sp>
-          <p:nvSpPr>
-            <p:cNvPr id="54" name="Rectangle 53"/>
-            <p:cNvSpPr/>
-            <p:nvPr/>
-          </p:nvSpPr>
-          <p:spPr>
-            <a:xfrm>
-              <a:off x="1866561" y="172188"/>
-              <a:ext cx="824334" cy="549556"/>
-            </a:xfrm>
-            <a:prstGeom prst="rect">
-              <a:avLst/>
-            </a:prstGeom>
-            <a:solidFill>
-              <a:schemeClr val="bg1"/>
-            </a:solidFill>
-            <a:ln w="28575">
-              <a:solidFill>
-                <a:schemeClr val="tx1"/>
-              </a:solidFill>
-            </a:ln>
-          </p:spPr>
-          <p:style>
-            <a:lnRef idx="2">
-              <a:schemeClr val="accent1">
-                <a:shade val="50000"/>
-              </a:schemeClr>
-            </a:lnRef>
-            <a:fillRef idx="1">
-              <a:schemeClr val="accent1"/>
-            </a:fillRef>
-            <a:effectRef idx="0">
-              <a:schemeClr val="accent1"/>
-            </a:effectRef>
-            <a:fontRef idx="minor">
-              <a:schemeClr val="lt1"/>
-            </a:fontRef>
-          </p:style>
-          <p:txBody>
-            <a:bodyPr rtlCol="0" anchor="ctr"/>
-            <a:lstStyle/>
-            <a:p>
-              <a:pPr algn="ctr"/>
-              <a:r>
-                <a:rPr lang="en-US" sz="1100" b="1" dirty="0" smtClean="0">
-                  <a:solidFill>
-                    <a:schemeClr val="tx1"/>
-                  </a:solidFill>
-                  <a:latin typeface="NimbusRomNo9L" panose="01010103010101010101" pitchFamily="2" charset="0"/>
-                  <a:cs typeface="Times New Roman" pitchFamily="18" charset="0"/>
-                </a:rPr>
-                <a:t>Duty-Cycle Controller</a:t>
-              </a:r>
-            </a:p>
-          </p:txBody>
-        </p:sp>
-        <p:cxnSp>
-          <p:nvCxnSpPr>
-            <p:cNvPr id="55" name="Straight Arrow Connector 54"/>
-            <p:cNvCxnSpPr>
-              <a:stCxn id="54" idx="3"/>
-              <a:endCxn id="52" idx="1"/>
-            </p:cNvCxnSpPr>
-            <p:nvPr/>
-          </p:nvCxnSpPr>
-          <p:spPr>
-            <a:xfrm>
-              <a:off x="2690895" y="446966"/>
-              <a:ext cx="599571" cy="0"/>
-            </a:xfrm>
-            <a:prstGeom prst="straightConnector1">
-              <a:avLst/>
-            </a:prstGeom>
-            <a:solidFill>
-              <a:schemeClr val="bg1"/>
-            </a:solidFill>
-            <a:ln w="19050">
-              <a:solidFill>
-                <a:schemeClr val="tx1"/>
-              </a:solidFill>
-              <a:headEnd type="none" w="med" len="med"/>
-              <a:tailEnd type="stealth" w="lg" len="lg"/>
-            </a:ln>
-          </p:spPr>
-          <p:style>
-            <a:lnRef idx="2">
-              <a:schemeClr val="accent1">
-                <a:shade val="50000"/>
-              </a:schemeClr>
-            </a:lnRef>
-            <a:fillRef idx="1">
-              <a:schemeClr val="accent1"/>
-            </a:fillRef>
-            <a:effectRef idx="0">
-              <a:schemeClr val="accent1"/>
-            </a:effectRef>
-            <a:fontRef idx="minor">
-              <a:schemeClr val="lt1"/>
-            </a:fontRef>
-          </p:style>
-        </p:cxnSp>
-      </p:grpSp>
-      <p:sp>
-        <p:nvSpPr>
-          <p:cNvPr id="73" name="Rectangle 72"/>
-          <p:cNvSpPr/>
-          <p:nvPr/>
-        </p:nvSpPr>
-        <p:spPr>
-          <a:xfrm>
-            <a:off x="1600200" y="896262"/>
-            <a:ext cx="2438401" cy="188051"/>
-          </a:xfrm>
-          <a:prstGeom prst="rect">
-            <a:avLst/>
-          </a:prstGeom>
-          <a:noFill/>
-          <a:ln w="28575">
-            <a:noFill/>
-          </a:ln>
-        </p:spPr>
-        <p:style>
-          <a:lnRef idx="2">
-            <a:schemeClr val="accent1">
-              <a:shade val="50000"/>
-            </a:schemeClr>
-          </a:lnRef>
-          <a:fillRef idx="1">
-            <a:schemeClr val="accent1"/>
-          </a:fillRef>
-          <a:effectRef idx="0">
-            <a:schemeClr val="accent1"/>
-          </a:effectRef>
-          <a:fontRef idx="minor">
-            <a:schemeClr val="lt1"/>
-          </a:fontRef>
-        </p:style>
-        <p:txBody>
-          <a:bodyPr rtlCol="0" anchor="ctr"/>
-          <a:lstStyle/>
-          <a:p>
-            <a:pPr algn="ctr"/>
-            <a:r>
-              <a:rPr lang="en-US" sz="1100" b="1" dirty="0" smtClean="0">
-                <a:solidFill>
-                  <a:schemeClr val="tx1"/>
-                </a:solidFill>
-                <a:latin typeface="NimbusRomNo9L" panose="01010103010101010101" pitchFamily="2" charset="0"/>
-                <a:cs typeface="Times New Roman" pitchFamily="18" charset="0"/>
-              </a:rPr>
-              <a:t>Robot Controller</a:t>
-            </a:r>
-            <a:endParaRPr lang="en-US" sz="1100" b="1" dirty="0">
-              <a:solidFill>
-                <a:schemeClr val="tx1"/>
-              </a:solidFill>
-              <a:latin typeface="NimbusRomNo9L" panose="01010103010101010101" pitchFamily="2" charset="0"/>
-              <a:cs typeface="Times New Roman" pitchFamily="18" charset="0"/>
-            </a:endParaRPr>
-          </a:p>
-        </p:txBody>
-      </p:sp>
+      <mc:AlternateContent xmlns:mc="http://schemas.openxmlformats.org/markup-compatibility/2006">
+        <mc:Choice xmlns:a14="http://schemas.microsoft.com/office/drawing/2010/main" Requires="a14">
+          <p:sp>
+            <p:nvSpPr>
+              <p:cNvPr id="5" name="Rectangle 4"/>
+              <p:cNvSpPr/>
+              <p:nvPr/>
+            </p:nvSpPr>
+            <p:spPr>
+              <a:xfrm>
+                <a:off x="342269" y="1483922"/>
+                <a:ext cx="419730" cy="246221"/>
+              </a:xfrm>
+              <a:prstGeom prst="rect">
+                <a:avLst/>
+              </a:prstGeom>
+            </p:spPr>
+            <p:txBody>
+              <a:bodyPr wrap="none">
+                <a:spAutoFit/>
+              </a:bodyPr>
+              <a:lstStyle/>
+              <a:p>
+                <a14:m>
+                  <m:oMathPara xmlns:m="http://schemas.openxmlformats.org/officeDocument/2006/math">
+                    <m:oMathParaPr>
+                      <m:jc m:val="centerGroup"/>
+                    </m:oMathParaPr>
+                    <m:oMath xmlns:m="http://schemas.openxmlformats.org/officeDocument/2006/math">
+                      <m:r>
+                        <a:rPr lang="en-US" b="0" i="1" smtClean="0">
+                          <a:latin typeface="Cambria Math" panose="02040503050406030204" pitchFamily="18" charset="0"/>
+                          <a:ea typeface="Cambria Math"/>
+                          <a:cs typeface="Times New Roman" pitchFamily="18" charset="0"/>
+                        </a:rPr>
+                        <m:t>𝑝</m:t>
+                      </m:r>
+                      <m:r>
+                        <a:rPr lang="en-US" b="0" i="1" smtClean="0">
+                          <a:latin typeface="Cambria Math" panose="02040503050406030204" pitchFamily="18" charset="0"/>
+                          <a:ea typeface="Cambria Math"/>
+                          <a:cs typeface="Times New Roman" pitchFamily="18" charset="0"/>
+                        </a:rPr>
+                        <m:t>, </m:t>
+                      </m:r>
+                      <m:r>
+                        <a:rPr lang="en-US" b="0" i="1" smtClean="0">
+                          <a:latin typeface="Cambria Math" panose="02040503050406030204" pitchFamily="18" charset="0"/>
+                          <a:ea typeface="Cambria Math"/>
+                          <a:cs typeface="Times New Roman" pitchFamily="18" charset="0"/>
+                        </a:rPr>
+                        <m:t>𝑅</m:t>
+                      </m:r>
+                    </m:oMath>
+                  </m:oMathPara>
+                </a14:m>
+                <a:endParaRPr lang="en-US" dirty="0"/>
+              </a:p>
+            </p:txBody>
+          </p:sp>
+        </mc:Choice>
+        <mc:Fallback>
+          <p:sp>
+            <p:nvSpPr>
+              <p:cNvPr id="5" name="Rectangle 4"/>
+              <p:cNvSpPr>
+                <a:spLocks noRot="1" noChangeAspect="1" noMove="1" noResize="1" noEditPoints="1" noAdjustHandles="1" noChangeArrowheads="1" noChangeShapeType="1" noTextEdit="1"/>
+              </p:cNvSpPr>
+              <p:nvPr/>
+            </p:nvSpPr>
+            <p:spPr>
+              <a:xfrm>
+                <a:off x="342269" y="1483922"/>
+                <a:ext cx="419730" cy="246221"/>
+              </a:xfrm>
+              <a:prstGeom prst="rect">
+                <a:avLst/>
+              </a:prstGeom>
+              <a:blipFill rotWithShape="0">
+                <a:blip r:embed="rId8"/>
+                <a:stretch>
+                  <a:fillRect/>
+                </a:stretch>
+              </a:blipFill>
+            </p:spPr>
+            <p:txBody>
+              <a:bodyPr/>
+              <a:lstStyle/>
+              <a:p>
+                <a:r>
+                  <a:rPr lang="en-US">
+                    <a:noFill/>
+                  </a:rPr>
+                  <a:t> </a:t>
+                </a:r>
+              </a:p>
+            </p:txBody>
+          </p:sp>
+        </mc:Fallback>
+      </mc:AlternateContent>
       <p:cxnSp>
         <p:nvCxnSpPr>
-          <p:cNvPr id="83" name="Straight Arrow Connector 82"/>
+          <p:cNvPr id="122" name="Straight Arrow Connector 121"/>
           <p:cNvCxnSpPr>
-            <a:stCxn id="52" idx="3"/>
-            <a:endCxn id="36" idx="1"/>
+            <a:stCxn id="107" idx="1"/>
+            <a:endCxn id="120" idx="3"/>
           </p:cNvCxnSpPr>
           <p:nvPr/>
         </p:nvCxnSpPr>
         <p:spPr>
-          <a:xfrm>
-            <a:off x="3943521" y="523166"/>
-            <a:ext cx="637473" cy="0"/>
+          <a:xfrm flipH="1">
+            <a:off x="1810512" y="1732189"/>
+            <a:ext cx="549192" cy="0"/>
           </a:xfrm>
           <a:prstGeom prst="straightConnector1">
             <a:avLst/>
@@ -5259,111 +5597,6 @@
           </a:fontRef>
         </p:style>
       </p:cxnSp>
-      <p:cxnSp>
-        <p:nvCxnSpPr>
-          <p:cNvPr id="84" name="Elbow Connector 83"/>
-          <p:cNvCxnSpPr>
-            <a:stCxn id="47" idx="1"/>
-            <a:endCxn id="35" idx="2"/>
-          </p:cNvCxnSpPr>
-          <p:nvPr/>
-        </p:nvCxnSpPr>
-        <p:spPr>
-          <a:xfrm rot="10800000">
-            <a:off x="735446" y="797945"/>
-            <a:ext cx="562245" cy="934245"/>
-          </a:xfrm>
-          <a:prstGeom prst="bentConnector2">
-            <a:avLst/>
-          </a:prstGeom>
-          <a:solidFill>
-            <a:schemeClr val="bg1"/>
-          </a:solidFill>
-          <a:ln w="19050">
-            <a:solidFill>
-              <a:schemeClr val="tx1"/>
-            </a:solidFill>
-            <a:headEnd type="none" w="med" len="med"/>
-            <a:tailEnd type="stealth" w="lg" len="lg"/>
-          </a:ln>
-        </p:spPr>
-        <p:style>
-          <a:lnRef idx="2">
-            <a:schemeClr val="accent1">
-              <a:shade val="50000"/>
-            </a:schemeClr>
-          </a:lnRef>
-          <a:fillRef idx="1">
-            <a:schemeClr val="accent1"/>
-          </a:fillRef>
-          <a:effectRef idx="0">
-            <a:schemeClr val="accent1"/>
-          </a:effectRef>
-          <a:fontRef idx="minor">
-            <a:schemeClr val="lt1"/>
-          </a:fontRef>
-        </p:style>
-      </p:cxnSp>
-      <p:sp>
-        <p:nvSpPr>
-          <p:cNvPr id="87" name="Rectangle 86"/>
-          <p:cNvSpPr/>
-          <p:nvPr/>
-        </p:nvSpPr>
-        <p:spPr>
-          <a:xfrm>
-            <a:off x="4049885" y="115971"/>
-            <a:ext cx="531109" cy="366371"/>
-          </a:xfrm>
-          <a:prstGeom prst="rect">
-            <a:avLst/>
-          </a:prstGeom>
-          <a:noFill/>
-          <a:ln w="28575">
-            <a:noFill/>
-          </a:ln>
-        </p:spPr>
-        <p:style>
-          <a:lnRef idx="2">
-            <a:schemeClr val="accent1">
-              <a:shade val="50000"/>
-            </a:schemeClr>
-          </a:lnRef>
-          <a:fillRef idx="1">
-            <a:schemeClr val="accent1"/>
-          </a:fillRef>
-          <a:effectRef idx="0">
-            <a:schemeClr val="accent1"/>
-          </a:effectRef>
-          <a:fontRef idx="minor">
-            <a:schemeClr val="lt1"/>
-          </a:fontRef>
-        </p:style>
-        <p:txBody>
-          <a:bodyPr lIns="0" rIns="0" rtlCol="0" anchor="ctr"/>
-          <a:lstStyle/>
-          <a:p>
-            <a:pPr algn="ctr"/>
-            <a:r>
-              <a:rPr lang="en-US" sz="1100" dirty="0" smtClean="0">
-                <a:solidFill>
-                  <a:schemeClr val="tx1"/>
-                </a:solidFill>
-                <a:latin typeface="NimbusRomNo9L" panose="01010103010101010101" pitchFamily="2" charset="0"/>
-                <a:cs typeface="Times New Roman" pitchFamily="18" charset="0"/>
-              </a:rPr>
-              <a:t>motor voltages</a:t>
-            </a:r>
-            <a:endParaRPr lang="en-US" sz="1100" dirty="0">
-              <a:solidFill>
-                <a:schemeClr val="tx1"/>
-              </a:solidFill>
-              <a:latin typeface="NimbusRomNo9L" panose="01010103010101010101" pitchFamily="2" charset="0"/>
-              <a:cs typeface="Times New Roman" pitchFamily="18" charset="0"/>
-            </a:endParaRPr>
-          </a:p>
-        </p:txBody>
-      </p:sp>
     </p:spTree>
     <p:extLst>
       <p:ext uri="{BB962C8B-B14F-4D97-AF65-F5344CB8AC3E}">

</xml_diff>